<commit_message>
[TASK] Optimizes specular lightning and adjusts presentation
</commit_message>
<xml_diff>
--- a/Talk/Shading & Lightning.pptx
+++ b/Talk/Shading & Lightning.pptx
@@ -1398,682 +1398,6 @@
       <dsp:cNvGrpSpPr/>
     </dsp:nvGrpSpPr>
     <dsp:grpSpPr/>
-    <dsp:sp modelId="{52FC016A-B4AE-4347-AA88-D89D3DCA07AD}">
-      <dsp:nvSpPr>
-        <dsp:cNvPr id="0" name=""/>
-        <dsp:cNvSpPr/>
-      </dsp:nvSpPr>
-      <dsp:spPr>
-        <a:xfrm>
-          <a:off x="380202" y="1866"/>
-          <a:ext cx="4344857" cy="1086214"/>
-        </a:xfrm>
-        <a:prstGeom prst="roundRect">
-          <a:avLst>
-            <a:gd name="adj" fmla="val 10000"/>
-          </a:avLst>
-        </a:prstGeom>
-        <a:solidFill>
-          <a:schemeClr val="accent1">
-            <a:hueOff val="0"/>
-            <a:satOff val="0"/>
-            <a:lumOff val="0"/>
-            <a:alphaOff val="0"/>
-          </a:schemeClr>
-        </a:solidFill>
-        <a:ln w="15875" cap="flat" cmpd="sng" algn="ctr">
-          <a:solidFill>
-            <a:schemeClr val="lt1">
-              <a:hueOff val="0"/>
-              <a:satOff val="0"/>
-              <a:lumOff val="0"/>
-              <a:alphaOff val="0"/>
-            </a:schemeClr>
-          </a:solidFill>
-          <a:prstDash val="solid"/>
-        </a:ln>
-        <a:effectLst/>
-      </dsp:spPr>
-      <dsp:style>
-        <a:lnRef idx="2">
-          <a:scrgbClr r="0" g="0" b="0"/>
-        </a:lnRef>
-        <a:fillRef idx="1">
-          <a:scrgbClr r="0" g="0" b="0"/>
-        </a:fillRef>
-        <a:effectRef idx="0">
-          <a:scrgbClr r="0" g="0" b="0"/>
-        </a:effectRef>
-        <a:fontRef idx="minor">
-          <a:schemeClr val="lt1"/>
-        </a:fontRef>
-      </dsp:style>
-      <dsp:txBody>
-        <a:bodyPr spcFirstLastPara="0" vert="horz" wrap="square" lIns="78740" tIns="78740" rIns="78740" bIns="78740" numCol="1" spcCol="1270" anchor="ctr" anchorCtr="0">
-          <a:noAutofit/>
-        </a:bodyPr>
-        <a:lstStyle/>
-        <a:p>
-          <a:pPr lvl="0" algn="ctr" defTabSz="2755900">
-            <a:lnSpc>
-              <a:spcPct val="90000"/>
-            </a:lnSpc>
-            <a:spcBef>
-              <a:spcPct val="0"/>
-            </a:spcBef>
-            <a:spcAft>
-              <a:spcPct val="35000"/>
-            </a:spcAft>
-          </a:pPr>
-          <a:r>
-            <a:rPr lang="de-DE" sz="6200" kern="1200" dirty="0" smtClean="0"/>
-            <a:t>OpenGL</a:t>
-          </a:r>
-          <a:endParaRPr lang="de-DE" sz="6200" kern="1200" dirty="0"/>
-        </a:p>
-      </dsp:txBody>
-      <dsp:txXfrm>
-        <a:off x="412016" y="33680"/>
-        <a:ext cx="4281229" cy="1022586"/>
-      </dsp:txXfrm>
-    </dsp:sp>
-    <dsp:sp modelId="{A37C163D-F833-4A20-B744-E085315ED804}">
-      <dsp:nvSpPr>
-        <dsp:cNvPr id="0" name=""/>
-        <dsp:cNvSpPr/>
-      </dsp:nvSpPr>
-      <dsp:spPr>
-        <a:xfrm rot="5400000">
-          <a:off x="2457587" y="1183124"/>
-          <a:ext cx="190087" cy="190087"/>
-        </a:xfrm>
-        <a:prstGeom prst="rightArrow">
-          <a:avLst>
-            <a:gd name="adj1" fmla="val 66700"/>
-            <a:gd name="adj2" fmla="val 50000"/>
-          </a:avLst>
-        </a:prstGeom>
-        <a:noFill/>
-        <a:ln>
-          <a:noFill/>
-        </a:ln>
-        <a:effectLst/>
-      </dsp:spPr>
-      <dsp:style>
-        <a:lnRef idx="0">
-          <a:scrgbClr r="0" g="0" b="0"/>
-        </a:lnRef>
-        <a:fillRef idx="1">
-          <a:scrgbClr r="0" g="0" b="0"/>
-        </a:fillRef>
-        <a:effectRef idx="0">
-          <a:scrgbClr r="0" g="0" b="0"/>
-        </a:effectRef>
-        <a:fontRef idx="minor">
-          <a:schemeClr val="lt1"/>
-        </a:fontRef>
-      </dsp:style>
-    </dsp:sp>
-    <dsp:sp modelId="{3B1A675A-0B2B-4156-8C44-79E68A2A3893}">
-      <dsp:nvSpPr>
-        <dsp:cNvPr id="0" name=""/>
-        <dsp:cNvSpPr/>
-      </dsp:nvSpPr>
-      <dsp:spPr>
-        <a:xfrm>
-          <a:off x="380202" y="1468255"/>
-          <a:ext cx="4344857" cy="1086214"/>
-        </a:xfrm>
-        <a:prstGeom prst="roundRect">
-          <a:avLst>
-            <a:gd name="adj" fmla="val 10000"/>
-          </a:avLst>
-        </a:prstGeom>
-        <a:solidFill>
-          <a:schemeClr val="accent1">
-            <a:alpha val="90000"/>
-            <a:tint val="40000"/>
-            <a:hueOff val="0"/>
-            <a:satOff val="0"/>
-            <a:lumOff val="0"/>
-            <a:alphaOff val="0"/>
-          </a:schemeClr>
-        </a:solidFill>
-        <a:ln w="15875" cap="flat" cmpd="sng" algn="ctr">
-          <a:solidFill>
-            <a:schemeClr val="accent1">
-              <a:alpha val="90000"/>
-              <a:tint val="40000"/>
-              <a:hueOff val="0"/>
-              <a:satOff val="0"/>
-              <a:lumOff val="0"/>
-              <a:alphaOff val="0"/>
-            </a:schemeClr>
-          </a:solidFill>
-          <a:prstDash val="solid"/>
-        </a:ln>
-        <a:effectLst/>
-      </dsp:spPr>
-      <dsp:style>
-        <a:lnRef idx="2">
-          <a:scrgbClr r="0" g="0" b="0"/>
-        </a:lnRef>
-        <a:fillRef idx="1">
-          <a:scrgbClr r="0" g="0" b="0"/>
-        </a:fillRef>
-        <a:effectRef idx="0">
-          <a:scrgbClr r="0" g="0" b="0"/>
-        </a:effectRef>
-        <a:fontRef idx="minor"/>
-      </dsp:style>
-      <dsp:txBody>
-        <a:bodyPr spcFirstLastPara="0" vert="horz" wrap="square" lIns="41910" tIns="41910" rIns="41910" bIns="41910" numCol="1" spcCol="1270" anchor="ctr" anchorCtr="0">
-          <a:noAutofit/>
-        </a:bodyPr>
-        <a:lstStyle/>
-        <a:p>
-          <a:pPr lvl="0" algn="ctr" defTabSz="1466850">
-            <a:lnSpc>
-              <a:spcPct val="90000"/>
-            </a:lnSpc>
-            <a:spcBef>
-              <a:spcPct val="0"/>
-            </a:spcBef>
-            <a:spcAft>
-              <a:spcPct val="35000"/>
-            </a:spcAft>
-          </a:pPr>
-          <a:r>
-            <a:rPr lang="de-DE" sz="3300" kern="1200" dirty="0" smtClean="0"/>
-            <a:t>GLSL</a:t>
-          </a:r>
-          <a:endParaRPr lang="de-DE" sz="3300" kern="1200" dirty="0"/>
-        </a:p>
-      </dsp:txBody>
-      <dsp:txXfrm>
-        <a:off x="412016" y="1500069"/>
-        <a:ext cx="4281229" cy="1022586"/>
-      </dsp:txXfrm>
-    </dsp:sp>
-    <dsp:sp modelId="{938331B0-C459-49AE-A25A-C7A20F8CC49C}">
-      <dsp:nvSpPr>
-        <dsp:cNvPr id="0" name=""/>
-        <dsp:cNvSpPr/>
-      </dsp:nvSpPr>
-      <dsp:spPr>
-        <a:xfrm rot="5400000">
-          <a:off x="2457587" y="2649513"/>
-          <a:ext cx="190087" cy="190087"/>
-        </a:xfrm>
-        <a:prstGeom prst="rightArrow">
-          <a:avLst>
-            <a:gd name="adj1" fmla="val 66700"/>
-            <a:gd name="adj2" fmla="val 50000"/>
-          </a:avLst>
-        </a:prstGeom>
-        <a:solidFill>
-          <a:schemeClr val="accent1">
-            <a:tint val="60000"/>
-            <a:hueOff val="0"/>
-            <a:satOff val="0"/>
-            <a:lumOff val="0"/>
-            <a:alphaOff val="0"/>
-          </a:schemeClr>
-        </a:solidFill>
-        <a:ln>
-          <a:noFill/>
-        </a:ln>
-        <a:effectLst/>
-      </dsp:spPr>
-      <dsp:style>
-        <a:lnRef idx="0">
-          <a:scrgbClr r="0" g="0" b="0"/>
-        </a:lnRef>
-        <a:fillRef idx="1">
-          <a:scrgbClr r="0" g="0" b="0"/>
-        </a:fillRef>
-        <a:effectRef idx="0">
-          <a:scrgbClr r="0" g="0" b="0"/>
-        </a:effectRef>
-        <a:fontRef idx="minor">
-          <a:schemeClr val="lt1"/>
-        </a:fontRef>
-      </dsp:style>
-    </dsp:sp>
-    <dsp:sp modelId="{ADE13DD1-9DD7-4843-B322-ED18E53A868A}">
-      <dsp:nvSpPr>
-        <dsp:cNvPr id="0" name=""/>
-        <dsp:cNvSpPr/>
-      </dsp:nvSpPr>
-      <dsp:spPr>
-        <a:xfrm>
-          <a:off x="380202" y="2934644"/>
-          <a:ext cx="4344857" cy="1086214"/>
-        </a:xfrm>
-        <a:prstGeom prst="roundRect">
-          <a:avLst>
-            <a:gd name="adj" fmla="val 10000"/>
-          </a:avLst>
-        </a:prstGeom>
-        <a:solidFill>
-          <a:schemeClr val="accent1">
-            <a:alpha val="90000"/>
-            <a:tint val="40000"/>
-            <a:hueOff val="0"/>
-            <a:satOff val="0"/>
-            <a:lumOff val="0"/>
-            <a:alphaOff val="0"/>
-          </a:schemeClr>
-        </a:solidFill>
-        <a:ln w="15875" cap="flat" cmpd="sng" algn="ctr">
-          <a:solidFill>
-            <a:schemeClr val="accent1">
-              <a:alpha val="90000"/>
-              <a:tint val="40000"/>
-              <a:hueOff val="0"/>
-              <a:satOff val="0"/>
-              <a:lumOff val="0"/>
-              <a:alphaOff val="0"/>
-            </a:schemeClr>
-          </a:solidFill>
-          <a:prstDash val="solid"/>
-        </a:ln>
-        <a:effectLst/>
-      </dsp:spPr>
-      <dsp:style>
-        <a:lnRef idx="2">
-          <a:scrgbClr r="0" g="0" b="0"/>
-        </a:lnRef>
-        <a:fillRef idx="1">
-          <a:scrgbClr r="0" g="0" b="0"/>
-        </a:fillRef>
-        <a:effectRef idx="0">
-          <a:scrgbClr r="0" g="0" b="0"/>
-        </a:effectRef>
-        <a:fontRef idx="minor"/>
-      </dsp:style>
-      <dsp:txBody>
-        <a:bodyPr spcFirstLastPara="0" vert="horz" wrap="square" lIns="41910" tIns="41910" rIns="41910" bIns="41910" numCol="1" spcCol="1270" anchor="ctr" anchorCtr="0">
-          <a:noAutofit/>
-        </a:bodyPr>
-        <a:lstStyle/>
-        <a:p>
-          <a:pPr lvl="0" algn="ctr" defTabSz="1466850">
-            <a:lnSpc>
-              <a:spcPct val="90000"/>
-            </a:lnSpc>
-            <a:spcBef>
-              <a:spcPct val="0"/>
-            </a:spcBef>
-            <a:spcAft>
-              <a:spcPct val="35000"/>
-            </a:spcAft>
-          </a:pPr>
-          <a:r>
-            <a:rPr lang="de-DE" sz="3300" kern="1200" dirty="0" smtClean="0"/>
-            <a:t>ARB </a:t>
-          </a:r>
-          <a:r>
-            <a:rPr lang="de-DE" sz="3300" kern="1200" dirty="0" err="1" smtClean="0"/>
-            <a:t>assembly</a:t>
-          </a:r>
-          <a:r>
-            <a:rPr lang="de-DE" sz="3300" kern="1200" dirty="0" smtClean="0"/>
-            <a:t> </a:t>
-          </a:r>
-          <a:r>
-            <a:rPr lang="de-DE" sz="3300" kern="1200" dirty="0" err="1" smtClean="0"/>
-            <a:t>language</a:t>
-          </a:r>
-          <a:endParaRPr lang="de-DE" sz="3300" kern="1200" dirty="0"/>
-        </a:p>
-      </dsp:txBody>
-      <dsp:txXfrm>
-        <a:off x="412016" y="2966458"/>
-        <a:ext cx="4281229" cy="1022586"/>
-      </dsp:txXfrm>
-    </dsp:sp>
-    <dsp:sp modelId="{F77F33D4-3C44-4DEA-B4D2-AEF98CA47908}">
-      <dsp:nvSpPr>
-        <dsp:cNvPr id="0" name=""/>
-        <dsp:cNvSpPr/>
-      </dsp:nvSpPr>
-      <dsp:spPr>
-        <a:xfrm>
-          <a:off x="5333340" y="1866"/>
-          <a:ext cx="4344857" cy="1086214"/>
-        </a:xfrm>
-        <a:prstGeom prst="roundRect">
-          <a:avLst>
-            <a:gd name="adj" fmla="val 10000"/>
-          </a:avLst>
-        </a:prstGeom>
-        <a:solidFill>
-          <a:schemeClr val="accent1">
-            <a:hueOff val="0"/>
-            <a:satOff val="0"/>
-            <a:lumOff val="0"/>
-            <a:alphaOff val="0"/>
-          </a:schemeClr>
-        </a:solidFill>
-        <a:ln w="15875" cap="flat" cmpd="sng" algn="ctr">
-          <a:solidFill>
-            <a:schemeClr val="lt1">
-              <a:hueOff val="0"/>
-              <a:satOff val="0"/>
-              <a:lumOff val="0"/>
-              <a:alphaOff val="0"/>
-            </a:schemeClr>
-          </a:solidFill>
-          <a:prstDash val="solid"/>
-        </a:ln>
-        <a:effectLst/>
-      </dsp:spPr>
-      <dsp:style>
-        <a:lnRef idx="2">
-          <a:scrgbClr r="0" g="0" b="0"/>
-        </a:lnRef>
-        <a:fillRef idx="1">
-          <a:scrgbClr r="0" g="0" b="0"/>
-        </a:fillRef>
-        <a:effectRef idx="0">
-          <a:scrgbClr r="0" g="0" b="0"/>
-        </a:effectRef>
-        <a:fontRef idx="minor">
-          <a:schemeClr val="lt1"/>
-        </a:fontRef>
-      </dsp:style>
-      <dsp:txBody>
-        <a:bodyPr spcFirstLastPara="0" vert="horz" wrap="square" lIns="78740" tIns="78740" rIns="78740" bIns="78740" numCol="1" spcCol="1270" anchor="ctr" anchorCtr="0">
-          <a:noAutofit/>
-        </a:bodyPr>
-        <a:lstStyle/>
-        <a:p>
-          <a:pPr lvl="0" algn="ctr" defTabSz="2755900">
-            <a:lnSpc>
-              <a:spcPct val="90000"/>
-            </a:lnSpc>
-            <a:spcBef>
-              <a:spcPct val="0"/>
-            </a:spcBef>
-            <a:spcAft>
-              <a:spcPct val="35000"/>
-            </a:spcAft>
-          </a:pPr>
-          <a:r>
-            <a:rPr lang="de-DE" sz="6200" kern="1200" dirty="0" smtClean="0"/>
-            <a:t>DirectX</a:t>
-          </a:r>
-          <a:endParaRPr lang="de-DE" sz="6200" kern="1200" dirty="0"/>
-        </a:p>
-      </dsp:txBody>
-      <dsp:txXfrm>
-        <a:off x="5365154" y="33680"/>
-        <a:ext cx="4281229" cy="1022586"/>
-      </dsp:txXfrm>
-    </dsp:sp>
-    <dsp:sp modelId="{2867A9FE-FF8A-4E27-A8E5-CB1A0A56F081}">
-      <dsp:nvSpPr>
-        <dsp:cNvPr id="0" name=""/>
-        <dsp:cNvSpPr/>
-      </dsp:nvSpPr>
-      <dsp:spPr>
-        <a:xfrm rot="5400000">
-          <a:off x="7410724" y="1183124"/>
-          <a:ext cx="190087" cy="190087"/>
-        </a:xfrm>
-        <a:prstGeom prst="rightArrow">
-          <a:avLst>
-            <a:gd name="adj1" fmla="val 66700"/>
-            <a:gd name="adj2" fmla="val 50000"/>
-          </a:avLst>
-        </a:prstGeom>
-        <a:solidFill>
-          <a:schemeClr val="bg1"/>
-        </a:solidFill>
-        <a:ln>
-          <a:noFill/>
-        </a:ln>
-        <a:effectLst/>
-      </dsp:spPr>
-      <dsp:style>
-        <a:lnRef idx="0">
-          <a:scrgbClr r="0" g="0" b="0"/>
-        </a:lnRef>
-        <a:fillRef idx="1">
-          <a:scrgbClr r="0" g="0" b="0"/>
-        </a:fillRef>
-        <a:effectRef idx="0">
-          <a:scrgbClr r="0" g="0" b="0"/>
-        </a:effectRef>
-        <a:fontRef idx="minor">
-          <a:schemeClr val="lt1"/>
-        </a:fontRef>
-      </dsp:style>
-    </dsp:sp>
-    <dsp:sp modelId="{6F36FF42-2D98-4874-8148-53F0648E31CA}">
-      <dsp:nvSpPr>
-        <dsp:cNvPr id="0" name=""/>
-        <dsp:cNvSpPr/>
-      </dsp:nvSpPr>
-      <dsp:spPr>
-        <a:xfrm>
-          <a:off x="5333340" y="1468255"/>
-          <a:ext cx="4344857" cy="1086214"/>
-        </a:xfrm>
-        <a:prstGeom prst="roundRect">
-          <a:avLst>
-            <a:gd name="adj" fmla="val 10000"/>
-          </a:avLst>
-        </a:prstGeom>
-        <a:solidFill>
-          <a:schemeClr val="accent1">
-            <a:alpha val="90000"/>
-            <a:tint val="40000"/>
-            <a:hueOff val="0"/>
-            <a:satOff val="0"/>
-            <a:lumOff val="0"/>
-            <a:alphaOff val="0"/>
-          </a:schemeClr>
-        </a:solidFill>
-        <a:ln w="15875" cap="flat" cmpd="sng" algn="ctr">
-          <a:solidFill>
-            <a:schemeClr val="accent1">
-              <a:alpha val="90000"/>
-              <a:tint val="40000"/>
-              <a:hueOff val="0"/>
-              <a:satOff val="0"/>
-              <a:lumOff val="0"/>
-              <a:alphaOff val="0"/>
-            </a:schemeClr>
-          </a:solidFill>
-          <a:prstDash val="solid"/>
-        </a:ln>
-        <a:effectLst/>
-      </dsp:spPr>
-      <dsp:style>
-        <a:lnRef idx="2">
-          <a:scrgbClr r="0" g="0" b="0"/>
-        </a:lnRef>
-        <a:fillRef idx="1">
-          <a:scrgbClr r="0" g="0" b="0"/>
-        </a:fillRef>
-        <a:effectRef idx="0">
-          <a:scrgbClr r="0" g="0" b="0"/>
-        </a:effectRef>
-        <a:fontRef idx="minor"/>
-      </dsp:style>
-      <dsp:txBody>
-        <a:bodyPr spcFirstLastPara="0" vert="horz" wrap="square" lIns="41910" tIns="41910" rIns="41910" bIns="41910" numCol="1" spcCol="1270" anchor="ctr" anchorCtr="0">
-          <a:noAutofit/>
-        </a:bodyPr>
-        <a:lstStyle/>
-        <a:p>
-          <a:pPr lvl="0" algn="ctr" defTabSz="1466850">
-            <a:lnSpc>
-              <a:spcPct val="90000"/>
-            </a:lnSpc>
-            <a:spcBef>
-              <a:spcPct val="0"/>
-            </a:spcBef>
-            <a:spcAft>
-              <a:spcPct val="35000"/>
-            </a:spcAft>
-          </a:pPr>
-          <a:r>
-            <a:rPr lang="de-DE" sz="3300" kern="1200" dirty="0" smtClean="0"/>
-            <a:t>HLSL</a:t>
-          </a:r>
-          <a:endParaRPr lang="de-DE" sz="3300" kern="1200" dirty="0"/>
-        </a:p>
-      </dsp:txBody>
-      <dsp:txXfrm>
-        <a:off x="5365154" y="1500069"/>
-        <a:ext cx="4281229" cy="1022586"/>
-      </dsp:txXfrm>
-    </dsp:sp>
-    <dsp:sp modelId="{19559425-F742-4927-AC69-6CB1E3345327}">
-      <dsp:nvSpPr>
-        <dsp:cNvPr id="0" name=""/>
-        <dsp:cNvSpPr/>
-      </dsp:nvSpPr>
-      <dsp:spPr>
-        <a:xfrm rot="5400000">
-          <a:off x="7410724" y="2649513"/>
-          <a:ext cx="190087" cy="190087"/>
-        </a:xfrm>
-        <a:prstGeom prst="rightArrow">
-          <a:avLst>
-            <a:gd name="adj1" fmla="val 66700"/>
-            <a:gd name="adj2" fmla="val 50000"/>
-          </a:avLst>
-        </a:prstGeom>
-        <a:solidFill>
-          <a:schemeClr val="accent1">
-            <a:tint val="60000"/>
-            <a:hueOff val="0"/>
-            <a:satOff val="0"/>
-            <a:lumOff val="0"/>
-            <a:alphaOff val="0"/>
-          </a:schemeClr>
-        </a:solidFill>
-        <a:ln>
-          <a:noFill/>
-        </a:ln>
-        <a:effectLst/>
-      </dsp:spPr>
-      <dsp:style>
-        <a:lnRef idx="0">
-          <a:scrgbClr r="0" g="0" b="0"/>
-        </a:lnRef>
-        <a:fillRef idx="1">
-          <a:scrgbClr r="0" g="0" b="0"/>
-        </a:fillRef>
-        <a:effectRef idx="0">
-          <a:scrgbClr r="0" g="0" b="0"/>
-        </a:effectRef>
-        <a:fontRef idx="minor">
-          <a:schemeClr val="lt1"/>
-        </a:fontRef>
-      </dsp:style>
-    </dsp:sp>
-    <dsp:sp modelId="{DC9E1B48-B852-4A26-A78A-0476CCBCB922}">
-      <dsp:nvSpPr>
-        <dsp:cNvPr id="0" name=""/>
-        <dsp:cNvSpPr/>
-      </dsp:nvSpPr>
-      <dsp:spPr>
-        <a:xfrm>
-          <a:off x="5333340" y="2934644"/>
-          <a:ext cx="4344857" cy="1086214"/>
-        </a:xfrm>
-        <a:prstGeom prst="roundRect">
-          <a:avLst>
-            <a:gd name="adj" fmla="val 10000"/>
-          </a:avLst>
-        </a:prstGeom>
-        <a:solidFill>
-          <a:schemeClr val="accent1">
-            <a:alpha val="90000"/>
-            <a:tint val="40000"/>
-            <a:hueOff val="0"/>
-            <a:satOff val="0"/>
-            <a:lumOff val="0"/>
-            <a:alphaOff val="0"/>
-          </a:schemeClr>
-        </a:solidFill>
-        <a:ln w="15875" cap="flat" cmpd="sng" algn="ctr">
-          <a:solidFill>
-            <a:schemeClr val="accent1">
-              <a:alpha val="90000"/>
-              <a:tint val="40000"/>
-              <a:hueOff val="0"/>
-              <a:satOff val="0"/>
-              <a:lumOff val="0"/>
-              <a:alphaOff val="0"/>
-            </a:schemeClr>
-          </a:solidFill>
-          <a:prstDash val="solid"/>
-        </a:ln>
-        <a:effectLst/>
-      </dsp:spPr>
-      <dsp:style>
-        <a:lnRef idx="2">
-          <a:scrgbClr r="0" g="0" b="0"/>
-        </a:lnRef>
-        <a:fillRef idx="1">
-          <a:scrgbClr r="0" g="0" b="0"/>
-        </a:fillRef>
-        <a:effectRef idx="0">
-          <a:scrgbClr r="0" g="0" b="0"/>
-        </a:effectRef>
-        <a:fontRef idx="minor"/>
-      </dsp:style>
-      <dsp:txBody>
-        <a:bodyPr spcFirstLastPara="0" vert="horz" wrap="square" lIns="41910" tIns="41910" rIns="41910" bIns="41910" numCol="1" spcCol="1270" anchor="ctr" anchorCtr="0">
-          <a:noAutofit/>
-        </a:bodyPr>
-        <a:lstStyle/>
-        <a:p>
-          <a:pPr lvl="0" algn="ctr" defTabSz="1466850">
-            <a:lnSpc>
-              <a:spcPct val="90000"/>
-            </a:lnSpc>
-            <a:spcBef>
-              <a:spcPct val="0"/>
-            </a:spcBef>
-            <a:spcAft>
-              <a:spcPct val="35000"/>
-            </a:spcAft>
-          </a:pPr>
-          <a:r>
-            <a:rPr lang="de-DE" sz="3300" kern="1200" dirty="0" smtClean="0"/>
-            <a:t>DirectX </a:t>
-          </a:r>
-          <a:r>
-            <a:rPr lang="de-DE" sz="3300" kern="1200" dirty="0" err="1" smtClean="0"/>
-            <a:t>Shader</a:t>
-          </a:r>
-          <a:r>
-            <a:rPr lang="de-DE" sz="3300" kern="1200" dirty="0" smtClean="0"/>
-            <a:t> </a:t>
-          </a:r>
-          <a:r>
-            <a:rPr lang="de-DE" sz="3300" kern="1200" dirty="0" err="1" smtClean="0"/>
-            <a:t>Assembly</a:t>
-          </a:r>
-          <a:r>
-            <a:rPr lang="de-DE" sz="3300" kern="1200" dirty="0" smtClean="0"/>
-            <a:t> Language</a:t>
-          </a:r>
-          <a:endParaRPr lang="de-DE" sz="3300" kern="1200" dirty="0"/>
-        </a:p>
-      </dsp:txBody>
-      <dsp:txXfrm>
-        <a:off x="5365154" y="2966458"/>
-        <a:ext cx="4281229" cy="1022586"/>
-      </dsp:txXfrm>
-    </dsp:sp>
   </dsp:spTree>
 </dsp:drawing>
 </file>
@@ -3600,7 +2924,7 @@
           <a:p>
             <a:fld id="{28C1DA9B-C2C1-4415-8F90-1515AC91E8D9}" type="datetimeFigureOut">
               <a:rPr lang="de-DE" smtClean="0"/>
-              <a:t>23.05.2016</a:t>
+              <a:t>24.05.2016</a:t>
             </a:fld>
             <a:endParaRPr lang="de-DE"/>
           </a:p>
@@ -3818,7 +3142,7 @@
           <a:p>
             <a:fld id="{28C1DA9B-C2C1-4415-8F90-1515AC91E8D9}" type="datetimeFigureOut">
               <a:rPr lang="de-DE" smtClean="0"/>
-              <a:t>23.05.2016</a:t>
+              <a:t>24.05.2016</a:t>
             </a:fld>
             <a:endParaRPr lang="de-DE"/>
           </a:p>
@@ -4084,7 +3408,7 @@
           <a:p>
             <a:fld id="{28C1DA9B-C2C1-4415-8F90-1515AC91E8D9}" type="datetimeFigureOut">
               <a:rPr lang="de-DE" smtClean="0"/>
-              <a:t>23.05.2016</a:t>
+              <a:t>24.05.2016</a:t>
             </a:fld>
             <a:endParaRPr lang="de-DE"/>
           </a:p>
@@ -4279,7 +3603,7 @@
           <a:p>
             <a:fld id="{28C1DA9B-C2C1-4415-8F90-1515AC91E8D9}" type="datetimeFigureOut">
               <a:rPr lang="de-DE" smtClean="0"/>
-              <a:t>23.05.2016</a:t>
+              <a:t>24.05.2016</a:t>
             </a:fld>
             <a:endParaRPr lang="de-DE"/>
           </a:p>
@@ -4710,7 +4034,7 @@
           <a:p>
             <a:fld id="{28C1DA9B-C2C1-4415-8F90-1515AC91E8D9}" type="datetimeFigureOut">
               <a:rPr lang="de-DE" smtClean="0"/>
-              <a:t>23.05.2016</a:t>
+              <a:t>24.05.2016</a:t>
             </a:fld>
             <a:endParaRPr lang="de-DE"/>
           </a:p>
@@ -4995,7 +4319,7 @@
           <a:p>
             <a:fld id="{28C1DA9B-C2C1-4415-8F90-1515AC91E8D9}" type="datetimeFigureOut">
               <a:rPr lang="de-DE" smtClean="0"/>
-              <a:t>23.05.2016</a:t>
+              <a:t>24.05.2016</a:t>
             </a:fld>
             <a:endParaRPr lang="de-DE"/>
           </a:p>
@@ -5384,7 +4708,7 @@
           <a:p>
             <a:fld id="{28C1DA9B-C2C1-4415-8F90-1515AC91E8D9}" type="datetimeFigureOut">
               <a:rPr lang="de-DE" smtClean="0"/>
-              <a:t>23.05.2016</a:t>
+              <a:t>24.05.2016</a:t>
             </a:fld>
             <a:endParaRPr lang="de-DE"/>
           </a:p>
@@ -5512,7 +4836,7 @@
           <a:p>
             <a:fld id="{28C1DA9B-C2C1-4415-8F90-1515AC91E8D9}" type="datetimeFigureOut">
               <a:rPr lang="de-DE" smtClean="0"/>
-              <a:t>23.05.2016</a:t>
+              <a:t>24.05.2016</a:t>
             </a:fld>
             <a:endParaRPr lang="de-DE"/>
           </a:p>
@@ -5693,7 +5017,7 @@
           <a:p>
             <a:fld id="{28C1DA9B-C2C1-4415-8F90-1515AC91E8D9}" type="datetimeFigureOut">
               <a:rPr lang="de-DE" smtClean="0"/>
-              <a:t>23.05.2016</a:t>
+              <a:t>24.05.2016</a:t>
             </a:fld>
             <a:endParaRPr lang="de-DE"/>
           </a:p>
@@ -6050,7 +5374,7 @@
           <a:p>
             <a:fld id="{28C1DA9B-C2C1-4415-8F90-1515AC91E8D9}" type="datetimeFigureOut">
               <a:rPr lang="de-DE" smtClean="0"/>
-              <a:t>23.05.2016</a:t>
+              <a:t>24.05.2016</a:t>
             </a:fld>
             <a:endParaRPr lang="de-DE"/>
           </a:p>
@@ -6435,7 +5759,7 @@
           <a:p>
             <a:fld id="{28C1DA9B-C2C1-4415-8F90-1515AC91E8D9}" type="datetimeFigureOut">
               <a:rPr lang="de-DE" smtClean="0"/>
-              <a:t>23.05.2016</a:t>
+              <a:t>24.05.2016</a:t>
             </a:fld>
             <a:endParaRPr lang="de-DE"/>
           </a:p>
@@ -6725,7 +6049,7 @@
           <a:p>
             <a:fld id="{28C1DA9B-C2C1-4415-8F90-1515AC91E8D9}" type="datetimeFigureOut">
               <a:rPr lang="de-DE" smtClean="0"/>
-              <a:t>23.05.2016</a:t>
+              <a:t>24.05.2016</a:t>
             </a:fld>
             <a:endParaRPr lang="de-DE"/>
           </a:p>
@@ -15915,16 +15239,317 @@
         </p:nvSpPr>
         <p:spPr>
           <a:xfrm>
-            <a:off x="1097280" y="1158857"/>
-            <a:ext cx="10732047" cy="4698661"/>
+            <a:off x="172529" y="1158857"/>
+            <a:ext cx="11846943" cy="5043535"/>
           </a:xfrm>
         </p:spPr>
         <p:txBody>
-          <a:bodyPr/>
+          <a:bodyPr>
+            <a:normAutofit/>
+          </a:bodyPr>
           <a:lstStyle/>
           <a:p>
             <a:r>
               <a:rPr lang="de-DE" sz="1800" dirty="0">
+                <a:solidFill>
+                  <a:srgbClr val="006400"/>
+                </a:solidFill>
+                <a:highlight>
+                  <a:srgbClr val="FFFFFF"/>
+                </a:highlight>
+                <a:latin typeface="Consolas" panose="020B0609020204030204" pitchFamily="49" charset="0"/>
+              </a:rPr>
+              <a:t>// </a:t>
+            </a:r>
+            <a:r>
+              <a:rPr lang="de-DE" sz="1800" dirty="0" err="1">
+                <a:solidFill>
+                  <a:srgbClr val="006400"/>
+                </a:solidFill>
+                <a:highlight>
+                  <a:srgbClr val="FFFFFF"/>
+                </a:highlight>
+                <a:latin typeface="Consolas" panose="020B0609020204030204" pitchFamily="49" charset="0"/>
+              </a:rPr>
+              <a:t>Const</a:t>
+            </a:r>
+            <a:r>
+              <a:rPr lang="de-DE" sz="1800" dirty="0">
+                <a:solidFill>
+                  <a:srgbClr val="006400"/>
+                </a:solidFill>
+                <a:highlight>
+                  <a:srgbClr val="FFFFFF"/>
+                </a:highlight>
+                <a:latin typeface="Consolas" panose="020B0609020204030204" pitchFamily="49" charset="0"/>
+              </a:rPr>
+              <a:t> </a:t>
+            </a:r>
+            <a:r>
+              <a:rPr lang="de-DE" sz="1800" dirty="0" err="1" smtClean="0">
+                <a:solidFill>
+                  <a:srgbClr val="006400"/>
+                </a:solidFill>
+                <a:highlight>
+                  <a:srgbClr val="FFFFFF"/>
+                </a:highlight>
+                <a:latin typeface="Consolas" panose="020B0609020204030204" pitchFamily="49" charset="0"/>
+              </a:rPr>
+              <a:t>inputs</a:t>
+            </a:r>
+            <a:endParaRPr lang="de-DE" sz="1800" dirty="0" smtClean="0">
+              <a:solidFill>
+                <a:srgbClr val="006400"/>
+              </a:solidFill>
+              <a:highlight>
+                <a:srgbClr val="FFFFFF"/>
+              </a:highlight>
+              <a:latin typeface="Consolas" panose="020B0609020204030204" pitchFamily="49" charset="0"/>
+            </a:endParaRPr>
+          </a:p>
+          <a:p>
+            <a:r>
+              <a:rPr lang="de-DE" sz="1800" dirty="0">
+                <a:solidFill>
+                  <a:srgbClr val="1E90FF"/>
+                </a:solidFill>
+                <a:highlight>
+                  <a:srgbClr val="FFFFFF"/>
+                </a:highlight>
+                <a:latin typeface="Consolas" panose="020B0609020204030204" pitchFamily="49" charset="0"/>
+              </a:rPr>
+              <a:t>uniform</a:t>
+            </a:r>
+            <a:r>
+              <a:rPr lang="de-DE" sz="1800" dirty="0">
+                <a:solidFill>
+                  <a:srgbClr val="000000"/>
+                </a:solidFill>
+                <a:highlight>
+                  <a:srgbClr val="FFFFFF"/>
+                </a:highlight>
+                <a:latin typeface="Consolas" panose="020B0609020204030204" pitchFamily="49" charset="0"/>
+              </a:rPr>
+              <a:t> </a:t>
+            </a:r>
+            <a:r>
+              <a:rPr lang="de-DE" sz="1800" dirty="0">
+                <a:solidFill>
+                  <a:srgbClr val="008000"/>
+                </a:solidFill>
+                <a:highlight>
+                  <a:srgbClr val="FFFFFF"/>
+                </a:highlight>
+                <a:latin typeface="Consolas" panose="020B0609020204030204" pitchFamily="49" charset="0"/>
+              </a:rPr>
+              <a:t>vec4</a:t>
+            </a:r>
+            <a:r>
+              <a:rPr lang="de-DE" sz="1800" dirty="0">
+                <a:solidFill>
+                  <a:srgbClr val="000000"/>
+                </a:solidFill>
+                <a:highlight>
+                  <a:srgbClr val="FFFFFF"/>
+                </a:highlight>
+                <a:latin typeface="Consolas" panose="020B0609020204030204" pitchFamily="49" charset="0"/>
+              </a:rPr>
+              <a:t> </a:t>
+            </a:r>
+            <a:r>
+              <a:rPr lang="de-DE" sz="1800" dirty="0" err="1">
+                <a:solidFill>
+                  <a:srgbClr val="000000"/>
+                </a:solidFill>
+                <a:highlight>
+                  <a:srgbClr val="FFFFFF"/>
+                </a:highlight>
+                <a:latin typeface="Consolas" panose="020B0609020204030204" pitchFamily="49" charset="0"/>
+              </a:rPr>
+              <a:t>camera</a:t>
+            </a:r>
+            <a:r>
+              <a:rPr lang="de-DE" sz="1800" dirty="0">
+                <a:solidFill>
+                  <a:srgbClr val="000000"/>
+                </a:solidFill>
+                <a:highlight>
+                  <a:srgbClr val="FFFFFF"/>
+                </a:highlight>
+                <a:latin typeface="Consolas" panose="020B0609020204030204" pitchFamily="49" charset="0"/>
+              </a:rPr>
+              <a:t>;</a:t>
+            </a:r>
+            <a:endParaRPr lang="de-DE" sz="1800" dirty="0" smtClean="0">
+              <a:solidFill>
+                <a:srgbClr val="1E90FF"/>
+              </a:solidFill>
+              <a:highlight>
+                <a:srgbClr val="FFFFFF"/>
+              </a:highlight>
+              <a:latin typeface="Consolas" panose="020B0609020204030204" pitchFamily="49" charset="0"/>
+            </a:endParaRPr>
+          </a:p>
+          <a:p>
+            <a:r>
+              <a:rPr lang="de-DE" sz="1800" dirty="0" smtClean="0">
+                <a:solidFill>
+                  <a:srgbClr val="1E90FF"/>
+                </a:solidFill>
+                <a:highlight>
+                  <a:srgbClr val="FFFFFF"/>
+                </a:highlight>
+                <a:latin typeface="Consolas" panose="020B0609020204030204" pitchFamily="49" charset="0"/>
+              </a:rPr>
+              <a:t>uniform</a:t>
+            </a:r>
+            <a:r>
+              <a:rPr lang="de-DE" sz="1800" dirty="0" smtClean="0">
+                <a:solidFill>
+                  <a:srgbClr val="000000"/>
+                </a:solidFill>
+                <a:highlight>
+                  <a:srgbClr val="FFFFFF"/>
+                </a:highlight>
+                <a:latin typeface="Consolas" panose="020B0609020204030204" pitchFamily="49" charset="0"/>
+              </a:rPr>
+              <a:t> </a:t>
+            </a:r>
+            <a:r>
+              <a:rPr lang="de-DE" sz="1800" dirty="0" err="1">
+                <a:solidFill>
+                  <a:srgbClr val="008000"/>
+                </a:solidFill>
+                <a:highlight>
+                  <a:srgbClr val="FFFFFF"/>
+                </a:highlight>
+                <a:latin typeface="Consolas" panose="020B0609020204030204" pitchFamily="49" charset="0"/>
+              </a:rPr>
+              <a:t>float</a:t>
+            </a:r>
+            <a:r>
+              <a:rPr lang="de-DE" sz="1800" dirty="0">
+                <a:solidFill>
+                  <a:srgbClr val="000000"/>
+                </a:solidFill>
+                <a:highlight>
+                  <a:srgbClr val="FFFFFF"/>
+                </a:highlight>
+                <a:latin typeface="Consolas" panose="020B0609020204030204" pitchFamily="49" charset="0"/>
+              </a:rPr>
+              <a:t> </a:t>
+            </a:r>
+            <a:r>
+              <a:rPr lang="de-DE" sz="1800" dirty="0" err="1">
+                <a:solidFill>
+                  <a:srgbClr val="000000"/>
+                </a:solidFill>
+                <a:highlight>
+                  <a:srgbClr val="FFFFFF"/>
+                </a:highlight>
+                <a:latin typeface="Consolas" panose="020B0609020204030204" pitchFamily="49" charset="0"/>
+              </a:rPr>
+              <a:t>materialSpecular</a:t>
+            </a:r>
+            <a:r>
+              <a:rPr lang="de-DE" sz="1800" dirty="0">
+                <a:solidFill>
+                  <a:srgbClr val="000000"/>
+                </a:solidFill>
+                <a:highlight>
+                  <a:srgbClr val="FFFFFF"/>
+                </a:highlight>
+                <a:latin typeface="Consolas" panose="020B0609020204030204" pitchFamily="49" charset="0"/>
+              </a:rPr>
+              <a:t>;</a:t>
+            </a:r>
+          </a:p>
+          <a:p>
+            <a:r>
+              <a:rPr lang="de-DE" sz="1800" dirty="0">
+                <a:solidFill>
+                  <a:srgbClr val="1E90FF"/>
+                </a:solidFill>
+                <a:highlight>
+                  <a:srgbClr val="FFFFFF"/>
+                </a:highlight>
+                <a:latin typeface="Consolas" panose="020B0609020204030204" pitchFamily="49" charset="0"/>
+              </a:rPr>
+              <a:t>uniform</a:t>
+            </a:r>
+            <a:r>
+              <a:rPr lang="de-DE" sz="1800" dirty="0">
+                <a:solidFill>
+                  <a:srgbClr val="000000"/>
+                </a:solidFill>
+                <a:highlight>
+                  <a:srgbClr val="FFFFFF"/>
+                </a:highlight>
+                <a:latin typeface="Consolas" panose="020B0609020204030204" pitchFamily="49" charset="0"/>
+              </a:rPr>
+              <a:t> </a:t>
+            </a:r>
+            <a:r>
+              <a:rPr lang="de-DE" sz="1800" dirty="0" err="1">
+                <a:solidFill>
+                  <a:srgbClr val="008000"/>
+                </a:solidFill>
+                <a:highlight>
+                  <a:srgbClr val="FFFFFF"/>
+                </a:highlight>
+                <a:latin typeface="Consolas" panose="020B0609020204030204" pitchFamily="49" charset="0"/>
+              </a:rPr>
+              <a:t>float</a:t>
+            </a:r>
+            <a:r>
+              <a:rPr lang="de-DE" sz="1800" dirty="0">
+                <a:solidFill>
+                  <a:srgbClr val="000000"/>
+                </a:solidFill>
+                <a:highlight>
+                  <a:srgbClr val="FFFFFF"/>
+                </a:highlight>
+                <a:latin typeface="Consolas" panose="020B0609020204030204" pitchFamily="49" charset="0"/>
+              </a:rPr>
+              <a:t> </a:t>
+            </a:r>
+            <a:r>
+              <a:rPr lang="de-DE" sz="1800" dirty="0" err="1">
+                <a:solidFill>
+                  <a:srgbClr val="000000"/>
+                </a:solidFill>
+                <a:highlight>
+                  <a:srgbClr val="FFFFFF"/>
+                </a:highlight>
+                <a:latin typeface="Consolas" panose="020B0609020204030204" pitchFamily="49" charset="0"/>
+              </a:rPr>
+              <a:t>materialShininess</a:t>
+            </a:r>
+            <a:r>
+              <a:rPr lang="de-DE" sz="1800" dirty="0">
+                <a:solidFill>
+                  <a:srgbClr val="000000"/>
+                </a:solidFill>
+                <a:highlight>
+                  <a:srgbClr val="FFFFFF"/>
+                </a:highlight>
+                <a:latin typeface="Consolas" panose="020B0609020204030204" pitchFamily="49" charset="0"/>
+              </a:rPr>
+              <a:t>;</a:t>
+            </a:r>
+            <a:endParaRPr lang="de-DE" sz="1800" dirty="0" smtClean="0">
+              <a:solidFill>
+                <a:srgbClr val="696969"/>
+              </a:solidFill>
+              <a:highlight>
+                <a:srgbClr val="FFFFFF"/>
+              </a:highlight>
+              <a:latin typeface="Consolas" panose="020B0609020204030204" pitchFamily="49" charset="0"/>
+            </a:endParaRPr>
+          </a:p>
+          <a:p>
+            <a:r>
+              <a:rPr lang="de-DE" sz="1800" dirty="0" smtClean="0">
                 <a:solidFill>
                   <a:srgbClr val="696969"/>
                 </a:solidFill>
@@ -16049,6 +15674,18 @@
           </a:p>
           <a:p>
             <a:r>
+              <a:rPr lang="de-DE" sz="1800" dirty="0" smtClean="0">
+                <a:solidFill>
+                  <a:srgbClr val="008000"/>
+                </a:solidFill>
+                <a:highlight>
+                  <a:srgbClr val="FFFFFF"/>
+                </a:highlight>
+                <a:latin typeface="Consolas" panose="020B0609020204030204" pitchFamily="49" charset="0"/>
+              </a:rPr>
+              <a:t>	</a:t>
+            </a:r>
+            <a:r>
               <a:rPr lang="de-DE" sz="1800" dirty="0">
                 <a:solidFill>
                   <a:srgbClr val="008000"/>
@@ -16058,7 +15695,7 @@
                 </a:highlight>
                 <a:latin typeface="Consolas" panose="020B0609020204030204" pitchFamily="49" charset="0"/>
               </a:rPr>
-              <a:t>	vec4</a:t>
+              <a:t>vec4</a:t>
             </a:r>
             <a:r>
               <a:rPr lang="de-DE" sz="1800" dirty="0">
@@ -16070,7 +15707,7 @@
                 </a:highlight>
                 <a:latin typeface="Consolas" panose="020B0609020204030204" pitchFamily="49" charset="0"/>
               </a:rPr>
-              <a:t> H = </a:t>
+              <a:t> R = </a:t>
             </a:r>
             <a:r>
               <a:rPr lang="de-DE" sz="1800" b="1" dirty="0" err="1">
@@ -16082,7 +15719,7 @@
                 </a:highlight>
                 <a:latin typeface="Consolas" panose="020B0609020204030204" pitchFamily="49" charset="0"/>
               </a:rPr>
-              <a:t>normalize</a:t>
+              <a:t>reflect</a:t>
             </a:r>
             <a:r>
               <a:rPr lang="de-DE" sz="1800" dirty="0">
@@ -16106,7 +15743,7 @@
                 </a:highlight>
                 <a:latin typeface="Consolas" panose="020B0609020204030204" pitchFamily="49" charset="0"/>
               </a:rPr>
-              <a:t>eye</a:t>
+              <a:t>normLightDir</a:t>
             </a:r>
             <a:r>
               <a:rPr lang="de-DE" sz="1800" dirty="0">
@@ -16118,22 +15755,10 @@
                 </a:highlight>
                 <a:latin typeface="Consolas" panose="020B0609020204030204" pitchFamily="49" charset="0"/>
               </a:rPr>
-              <a:t> - </a:t>
-            </a:r>
-            <a:r>
-              <a:rPr lang="de-DE" sz="1800" dirty="0" err="1">
-                <a:solidFill>
-                  <a:srgbClr val="000000"/>
-                </a:solidFill>
-                <a:highlight>
-                  <a:srgbClr val="FFFFFF"/>
-                </a:highlight>
-                <a:latin typeface="Consolas" panose="020B0609020204030204" pitchFamily="49" charset="0"/>
-              </a:rPr>
-              <a:t>normLightDir</a:t>
-            </a:r>
-            <a:r>
-              <a:rPr lang="de-DE" sz="1800" dirty="0">
+              <a:t>, n</a:t>
+            </a:r>
+            <a:r>
+              <a:rPr lang="de-DE" sz="1800" dirty="0" smtClean="0">
                 <a:solidFill>
                   <a:srgbClr val="000000"/>
                 </a:solidFill>
@@ -16144,22 +15769,381 @@
               </a:rPr>
               <a:t>);</a:t>
             </a:r>
+            <a:endParaRPr lang="de-DE" sz="1800" dirty="0" smtClean="0">
+              <a:solidFill>
+                <a:srgbClr val="000000"/>
+              </a:solidFill>
+              <a:highlight>
+                <a:srgbClr val="FFFFFF"/>
+              </a:highlight>
+              <a:latin typeface="Consolas" panose="020B0609020204030204" pitchFamily="49" charset="0"/>
+            </a:endParaRPr>
           </a:p>
           <a:p>
             <a:pPr marL="0" indent="0">
               <a:buNone/>
             </a:pPr>
             <a:r>
+              <a:rPr lang="de-DE" sz="1800" dirty="0">
+                <a:solidFill>
+                  <a:srgbClr val="000000"/>
+                </a:solidFill>
+                <a:highlight>
+                  <a:srgbClr val="FFFFFF"/>
+                </a:highlight>
+                <a:latin typeface="Consolas" panose="020B0609020204030204" pitchFamily="49" charset="0"/>
+              </a:rPr>
+              <a:t>	</a:t>
+            </a:r>
+            <a:r>
+              <a:rPr lang="en-US" sz="1800" dirty="0" smtClean="0">
+                <a:solidFill>
+                  <a:srgbClr val="008000"/>
+                </a:solidFill>
+                <a:highlight>
+                  <a:srgbClr val="FFFFFF"/>
+                </a:highlight>
+                <a:latin typeface="Consolas" panose="020B0609020204030204" pitchFamily="49" charset="0"/>
+              </a:rPr>
+              <a:t>float</a:t>
+            </a:r>
+            <a:r>
+              <a:rPr lang="en-US" sz="1800" dirty="0" smtClean="0">
+                <a:solidFill>
+                  <a:srgbClr val="000000"/>
+                </a:solidFill>
+                <a:highlight>
+                  <a:srgbClr val="FFFFFF"/>
+                </a:highlight>
+                <a:latin typeface="Consolas" panose="020B0609020204030204" pitchFamily="49" charset="0"/>
+              </a:rPr>
+              <a:t> </a:t>
+            </a:r>
+            <a:r>
+              <a:rPr lang="en-US" sz="1800" dirty="0">
+                <a:solidFill>
+                  <a:srgbClr val="000000"/>
+                </a:solidFill>
+                <a:highlight>
+                  <a:srgbClr val="FFFFFF"/>
+                </a:highlight>
+                <a:latin typeface="Consolas" panose="020B0609020204030204" pitchFamily="49" charset="0"/>
+              </a:rPr>
+              <a:t>specular = </a:t>
+            </a:r>
+            <a:r>
+              <a:rPr lang="en-US" sz="1800" b="1" dirty="0">
+                <a:solidFill>
+                  <a:srgbClr val="800000"/>
+                </a:solidFill>
+                <a:highlight>
+                  <a:srgbClr val="FFFFFF"/>
+                </a:highlight>
+                <a:latin typeface="Consolas" panose="020B0609020204030204" pitchFamily="49" charset="0"/>
+              </a:rPr>
+              <a:t>max</a:t>
+            </a:r>
+            <a:r>
+              <a:rPr lang="en-US" sz="1800" dirty="0">
+                <a:solidFill>
+                  <a:srgbClr val="000000"/>
+                </a:solidFill>
+                <a:highlight>
+                  <a:srgbClr val="FFFFFF"/>
+                </a:highlight>
+                <a:latin typeface="Consolas" panose="020B0609020204030204" pitchFamily="49" charset="0"/>
+              </a:rPr>
+              <a:t>(</a:t>
+            </a:r>
+            <a:r>
+              <a:rPr lang="en-US" sz="1800" b="1" dirty="0">
+                <a:solidFill>
+                  <a:srgbClr val="800000"/>
+                </a:solidFill>
+                <a:highlight>
+                  <a:srgbClr val="FFFFFF"/>
+                </a:highlight>
+                <a:latin typeface="Consolas" panose="020B0609020204030204" pitchFamily="49" charset="0"/>
+              </a:rPr>
+              <a:t>pow</a:t>
+            </a:r>
+            <a:r>
+              <a:rPr lang="en-US" sz="1800" dirty="0" smtClean="0">
+                <a:solidFill>
+                  <a:srgbClr val="000000"/>
+                </a:solidFill>
+                <a:highlight>
+                  <a:srgbClr val="FFFFFF"/>
+                </a:highlight>
+                <a:latin typeface="Consolas" panose="020B0609020204030204" pitchFamily="49" charset="0"/>
+              </a:rPr>
+              <a:t>(-1 * </a:t>
+            </a:r>
+            <a:r>
+              <a:rPr lang="en-US" sz="1800" b="1" dirty="0" smtClean="0">
+                <a:solidFill>
+                  <a:srgbClr val="800000"/>
+                </a:solidFill>
+                <a:highlight>
+                  <a:srgbClr val="FFFFFF"/>
+                </a:highlight>
+                <a:latin typeface="Consolas" panose="020B0609020204030204" pitchFamily="49" charset="0"/>
+              </a:rPr>
+              <a:t>dot</a:t>
+            </a:r>
+            <a:r>
+              <a:rPr lang="en-US" sz="1800" dirty="0" smtClean="0">
+                <a:solidFill>
+                  <a:srgbClr val="000000"/>
+                </a:solidFill>
+                <a:highlight>
+                  <a:srgbClr val="FFFFFF"/>
+                </a:highlight>
+                <a:latin typeface="Consolas" panose="020B0609020204030204" pitchFamily="49" charset="0"/>
+              </a:rPr>
+              <a:t>(R</a:t>
+            </a:r>
+            <a:r>
+              <a:rPr lang="en-US" sz="1800" dirty="0">
+                <a:solidFill>
+                  <a:srgbClr val="000000"/>
+                </a:solidFill>
+                <a:highlight>
+                  <a:srgbClr val="FFFFFF"/>
+                </a:highlight>
+                <a:latin typeface="Consolas" panose="020B0609020204030204" pitchFamily="49" charset="0"/>
+              </a:rPr>
+              <a:t>, </a:t>
+            </a:r>
+            <a:r>
+              <a:rPr lang="de-DE" sz="1800" dirty="0" err="1" smtClean="0">
+                <a:solidFill>
+                  <a:srgbClr val="000000"/>
+                </a:solidFill>
+                <a:highlight>
+                  <a:srgbClr val="FFFFFF"/>
+                </a:highlight>
+                <a:latin typeface="Consolas" panose="020B0609020204030204" pitchFamily="49" charset="0"/>
+              </a:rPr>
+              <a:t>normC</a:t>
+            </a:r>
+            <a:r>
+              <a:rPr lang="en-US" sz="1800" dirty="0" smtClean="0">
+                <a:solidFill>
+                  <a:srgbClr val="000000"/>
+                </a:solidFill>
+                <a:highlight>
+                  <a:srgbClr val="FFFFFF"/>
+                </a:highlight>
+                <a:latin typeface="Consolas" panose="020B0609020204030204" pitchFamily="49" charset="0"/>
+              </a:rPr>
+              <a:t>), </a:t>
+            </a:r>
+            <a:r>
+              <a:rPr lang="en-US" sz="1800" dirty="0" err="1">
+                <a:solidFill>
+                  <a:srgbClr val="000000"/>
+                </a:solidFill>
+                <a:highlight>
+                  <a:srgbClr val="FFFFFF"/>
+                </a:highlight>
+                <a:latin typeface="Consolas" panose="020B0609020204030204" pitchFamily="49" charset="0"/>
+              </a:rPr>
+              <a:t>materialShininess</a:t>
+            </a:r>
+            <a:r>
+              <a:rPr lang="en-US" sz="1800" dirty="0">
+                <a:solidFill>
+                  <a:srgbClr val="000000"/>
+                </a:solidFill>
+                <a:highlight>
+                  <a:srgbClr val="FFFFFF"/>
+                </a:highlight>
+                <a:latin typeface="Consolas" panose="020B0609020204030204" pitchFamily="49" charset="0"/>
+              </a:rPr>
+              <a:t>), </a:t>
+            </a:r>
+            <a:r>
+              <a:rPr lang="en-US" sz="1800" dirty="0">
+                <a:solidFill>
+                  <a:srgbClr val="00FFFF"/>
+                </a:solidFill>
+                <a:highlight>
+                  <a:srgbClr val="FFFFFF"/>
+                </a:highlight>
+                <a:latin typeface="Consolas" panose="020B0609020204030204" pitchFamily="49" charset="0"/>
+              </a:rPr>
+              <a:t>0</a:t>
+            </a:r>
+            <a:r>
+              <a:rPr lang="en-US" sz="1800" dirty="0">
+                <a:solidFill>
+                  <a:srgbClr val="000000"/>
+                </a:solidFill>
+                <a:highlight>
+                  <a:srgbClr val="FFFFFF"/>
+                </a:highlight>
+                <a:latin typeface="Consolas" panose="020B0609020204030204" pitchFamily="49" charset="0"/>
+              </a:rPr>
+              <a:t>) * </a:t>
+            </a:r>
+            <a:r>
+              <a:rPr lang="en-US" sz="1800" dirty="0" err="1">
+                <a:solidFill>
+                  <a:srgbClr val="000000"/>
+                </a:solidFill>
+                <a:highlight>
+                  <a:srgbClr val="FFFFFF"/>
+                </a:highlight>
+                <a:latin typeface="Consolas" panose="020B0609020204030204" pitchFamily="49" charset="0"/>
+              </a:rPr>
+              <a:t>materialSpecular</a:t>
+            </a:r>
+            <a:r>
+              <a:rPr lang="en-US" sz="1800" dirty="0" smtClean="0">
+                <a:solidFill>
+                  <a:srgbClr val="000000"/>
+                </a:solidFill>
+                <a:highlight>
+                  <a:srgbClr val="FFFFFF"/>
+                </a:highlight>
+                <a:latin typeface="Consolas" panose="020B0609020204030204" pitchFamily="49" charset="0"/>
+              </a:rPr>
+              <a:t>;</a:t>
+            </a:r>
+          </a:p>
+          <a:p>
+            <a:r>
               <a:rPr lang="pt-BR" sz="1800" dirty="0" smtClean="0">
                 <a:solidFill>
-                  <a:srgbClr val="008000"/>
-                </a:solidFill>
-                <a:highlight>
-                  <a:srgbClr val="FFFFFF"/>
-                </a:highlight>
-                <a:latin typeface="Consolas" panose="020B0609020204030204" pitchFamily="49" charset="0"/>
-              </a:rPr>
-              <a:t>	float</a:t>
+                  <a:srgbClr val="000000"/>
+                </a:solidFill>
+                <a:highlight>
+                  <a:srgbClr val="FFFFFF"/>
+                </a:highlight>
+                <a:latin typeface="Consolas" panose="020B0609020204030204" pitchFamily="49" charset="0"/>
+              </a:rPr>
+              <a:t>	</a:t>
+            </a:r>
+            <a:r>
+              <a:rPr lang="de-DE" sz="1800" dirty="0" err="1" smtClean="0">
+                <a:solidFill>
+                  <a:srgbClr val="000000"/>
+                </a:solidFill>
+                <a:highlight>
+                  <a:srgbClr val="FFFFFF"/>
+                </a:highlight>
+                <a:latin typeface="Consolas" panose="020B0609020204030204" pitchFamily="49" charset="0"/>
+              </a:rPr>
+              <a:t>Out_Color</a:t>
+            </a:r>
+            <a:r>
+              <a:rPr lang="de-DE" sz="1800" dirty="0" smtClean="0">
+                <a:solidFill>
+                  <a:srgbClr val="000000"/>
+                </a:solidFill>
+                <a:highlight>
+                  <a:srgbClr val="FFFFFF"/>
+                </a:highlight>
+                <a:latin typeface="Consolas" panose="020B0609020204030204" pitchFamily="49" charset="0"/>
+              </a:rPr>
+              <a:t> = </a:t>
+            </a:r>
+            <a:r>
+              <a:rPr lang="de-DE" sz="1800" dirty="0" err="1" smtClean="0">
+                <a:solidFill>
+                  <a:srgbClr val="800000"/>
+                </a:solidFill>
+                <a:highlight>
+                  <a:srgbClr val="FFFFFF"/>
+                </a:highlight>
+                <a:latin typeface="Consolas" panose="020B0609020204030204" pitchFamily="49" charset="0"/>
+              </a:rPr>
+              <a:t>max</a:t>
+            </a:r>
+            <a:r>
+              <a:rPr lang="de-DE" sz="1800" dirty="0" smtClean="0">
+                <a:solidFill>
+                  <a:srgbClr val="000000"/>
+                </a:solidFill>
+                <a:highlight>
+                  <a:srgbClr val="FFFFFF"/>
+                </a:highlight>
+                <a:latin typeface="Consolas" panose="020B0609020204030204" pitchFamily="49" charset="0"/>
+              </a:rPr>
+              <a:t>(</a:t>
+            </a:r>
+            <a:r>
+              <a:rPr lang="de-DE" sz="1800" dirty="0" err="1" smtClean="0">
+                <a:solidFill>
+                  <a:srgbClr val="800000"/>
+                </a:solidFill>
+                <a:highlight>
+                  <a:srgbClr val="FFFFFF"/>
+                </a:highlight>
+                <a:latin typeface="Consolas" panose="020B0609020204030204" pitchFamily="49" charset="0"/>
+              </a:rPr>
+              <a:t>texture</a:t>
+            </a:r>
+            <a:r>
+              <a:rPr lang="de-DE" sz="1800" dirty="0" smtClean="0">
+                <a:solidFill>
+                  <a:srgbClr val="000000"/>
+                </a:solidFill>
+                <a:highlight>
+                  <a:srgbClr val="FFFFFF"/>
+                </a:highlight>
+                <a:latin typeface="Consolas" panose="020B0609020204030204" pitchFamily="49" charset="0"/>
+              </a:rPr>
+              <a:t>(tex0, </a:t>
+            </a:r>
+            <a:r>
+              <a:rPr lang="de-DE" sz="1800" dirty="0" err="1" smtClean="0">
+                <a:solidFill>
+                  <a:srgbClr val="000000"/>
+                </a:solidFill>
+                <a:highlight>
+                  <a:srgbClr val="FFFFFF"/>
+                </a:highlight>
+                <a:latin typeface="Consolas" panose="020B0609020204030204" pitchFamily="49" charset="0"/>
+              </a:rPr>
+              <a:t>texCoord</a:t>
+            </a:r>
+            <a:r>
+              <a:rPr lang="de-DE" sz="1800" dirty="0" smtClean="0">
+                <a:solidFill>
+                  <a:srgbClr val="000000"/>
+                </a:solidFill>
+                <a:highlight>
+                  <a:srgbClr val="FFFFFF"/>
+                </a:highlight>
+                <a:latin typeface="Consolas" panose="020B0609020204030204" pitchFamily="49" charset="0"/>
+              </a:rPr>
+              <a:t>) * </a:t>
+            </a:r>
+            <a:r>
+              <a:rPr lang="de-DE" sz="1800" dirty="0" err="1" smtClean="0">
+                <a:solidFill>
+                  <a:srgbClr val="000000"/>
+                </a:solidFill>
+                <a:highlight>
+                  <a:srgbClr val="FFFFFF"/>
+                </a:highlight>
+                <a:latin typeface="Consolas" panose="020B0609020204030204" pitchFamily="49" charset="0"/>
+              </a:rPr>
+              <a:t>intensity</a:t>
+            </a:r>
+            <a:r>
+              <a:rPr lang="de-DE" sz="1800" dirty="0" smtClean="0">
+                <a:solidFill>
+                  <a:srgbClr val="000000"/>
+                </a:solidFill>
+                <a:highlight>
+                  <a:srgbClr val="FFFFFF"/>
+                </a:highlight>
+                <a:latin typeface="Consolas" panose="020B0609020204030204" pitchFamily="49" charset="0"/>
+              </a:rPr>
+              <a:t> + </a:t>
             </a:r>
             <a:r>
               <a:rPr lang="pt-BR" sz="1800" dirty="0" smtClean="0">
@@ -16171,327 +16155,22 @@
                 </a:highlight>
                 <a:latin typeface="Consolas" panose="020B0609020204030204" pitchFamily="49" charset="0"/>
               </a:rPr>
-              <a:t> </a:t>
-            </a:r>
-            <a:r>
-              <a:rPr lang="pt-BR" sz="1800" dirty="0">
-                <a:solidFill>
-                  <a:srgbClr val="000000"/>
-                </a:solidFill>
-                <a:highlight>
-                  <a:srgbClr val="FFFFFF"/>
-                </a:highlight>
-                <a:latin typeface="Consolas" panose="020B0609020204030204" pitchFamily="49" charset="0"/>
-              </a:rPr>
-              <a:t>specular = </a:t>
-            </a:r>
-            <a:r>
-              <a:rPr lang="pt-BR" sz="1800" b="1" dirty="0">
-                <a:solidFill>
-                  <a:srgbClr val="800000"/>
-                </a:solidFill>
-                <a:highlight>
-                  <a:srgbClr val="FFFFFF"/>
-                </a:highlight>
-                <a:latin typeface="Consolas" panose="020B0609020204030204" pitchFamily="49" charset="0"/>
-              </a:rPr>
-              <a:t>max</a:t>
-            </a:r>
-            <a:r>
-              <a:rPr lang="pt-BR" sz="1800" dirty="0">
-                <a:solidFill>
-                  <a:srgbClr val="000000"/>
-                </a:solidFill>
-                <a:highlight>
-                  <a:srgbClr val="FFFFFF"/>
-                </a:highlight>
-                <a:latin typeface="Consolas" panose="020B0609020204030204" pitchFamily="49" charset="0"/>
-              </a:rPr>
-              <a:t>(</a:t>
-            </a:r>
-            <a:r>
-              <a:rPr lang="pt-BR" sz="1800" b="1" dirty="0">
-                <a:solidFill>
-                  <a:srgbClr val="800000"/>
-                </a:solidFill>
-                <a:highlight>
-                  <a:srgbClr val="FFFFFF"/>
-                </a:highlight>
-                <a:latin typeface="Consolas" panose="020B0609020204030204" pitchFamily="49" charset="0"/>
-              </a:rPr>
-              <a:t>pow</a:t>
-            </a:r>
-            <a:r>
-              <a:rPr lang="pt-BR" sz="1800" dirty="0">
-                <a:solidFill>
-                  <a:srgbClr val="000000"/>
-                </a:solidFill>
-                <a:highlight>
-                  <a:srgbClr val="FFFFFF"/>
-                </a:highlight>
-                <a:latin typeface="Consolas" panose="020B0609020204030204" pitchFamily="49" charset="0"/>
-              </a:rPr>
-              <a:t>(</a:t>
-            </a:r>
-            <a:r>
-              <a:rPr lang="pt-BR" sz="1800" b="1" dirty="0">
-                <a:solidFill>
-                  <a:srgbClr val="800000"/>
-                </a:solidFill>
-                <a:highlight>
-                  <a:srgbClr val="FFFFFF"/>
-                </a:highlight>
-                <a:latin typeface="Consolas" panose="020B0609020204030204" pitchFamily="49" charset="0"/>
-              </a:rPr>
-              <a:t>dot</a:t>
-            </a:r>
-            <a:r>
-              <a:rPr lang="pt-BR" sz="1800" dirty="0">
-                <a:solidFill>
-                  <a:srgbClr val="000000"/>
-                </a:solidFill>
-                <a:highlight>
-                  <a:srgbClr val="FFFFFF"/>
-                </a:highlight>
-                <a:latin typeface="Consolas" panose="020B0609020204030204" pitchFamily="49" charset="0"/>
-              </a:rPr>
-              <a:t>(H, n), </a:t>
-            </a:r>
-            <a:r>
-              <a:rPr lang="pt-BR" sz="1800" dirty="0">
-                <a:solidFill>
-                  <a:srgbClr val="00FFFF"/>
-                </a:solidFill>
-                <a:highlight>
-                  <a:srgbClr val="FFFFFF"/>
-                </a:highlight>
-                <a:latin typeface="Consolas" panose="020B0609020204030204" pitchFamily="49" charset="0"/>
-              </a:rPr>
-              <a:t>200</a:t>
-            </a:r>
-            <a:r>
-              <a:rPr lang="pt-BR" sz="1800" dirty="0">
-                <a:solidFill>
-                  <a:srgbClr val="000000"/>
-                </a:solidFill>
-                <a:highlight>
-                  <a:srgbClr val="FFFFFF"/>
-                </a:highlight>
-                <a:latin typeface="Consolas" panose="020B0609020204030204" pitchFamily="49" charset="0"/>
-              </a:rPr>
-              <a:t>), </a:t>
-            </a:r>
-            <a:r>
-              <a:rPr lang="pt-BR" sz="1800" dirty="0">
-                <a:solidFill>
-                  <a:srgbClr val="00FFFF"/>
-                </a:solidFill>
-                <a:highlight>
-                  <a:srgbClr val="FFFFFF"/>
-                </a:highlight>
-                <a:latin typeface="Consolas" panose="020B0609020204030204" pitchFamily="49" charset="0"/>
-              </a:rPr>
-              <a:t>0</a:t>
-            </a:r>
-            <a:r>
-              <a:rPr lang="pt-BR" sz="1800" dirty="0">
-                <a:solidFill>
-                  <a:srgbClr val="000000"/>
-                </a:solidFill>
-                <a:highlight>
-                  <a:srgbClr val="FFFFFF"/>
-                </a:highlight>
-                <a:latin typeface="Consolas" panose="020B0609020204030204" pitchFamily="49" charset="0"/>
-              </a:rPr>
-              <a:t>) * </a:t>
-            </a:r>
-            <a:r>
-              <a:rPr lang="pt-BR" sz="1800" dirty="0">
-                <a:solidFill>
-                  <a:srgbClr val="00FFFF"/>
-                </a:solidFill>
-                <a:highlight>
-                  <a:srgbClr val="FFFFFF"/>
-                </a:highlight>
-                <a:latin typeface="Consolas" panose="020B0609020204030204" pitchFamily="49" charset="0"/>
-              </a:rPr>
-              <a:t>0.2</a:t>
-            </a:r>
-            <a:r>
-              <a:rPr lang="pt-BR" sz="1800" dirty="0" smtClean="0">
-                <a:solidFill>
-                  <a:srgbClr val="000000"/>
-                </a:solidFill>
-                <a:highlight>
-                  <a:srgbClr val="FFFFFF"/>
-                </a:highlight>
-                <a:latin typeface="Consolas" panose="020B0609020204030204" pitchFamily="49" charset="0"/>
-              </a:rPr>
-              <a:t>;</a:t>
-            </a:r>
-          </a:p>
-          <a:p>
-            <a:pPr marL="0" indent="0">
-              <a:buNone/>
-            </a:pPr>
-            <a:r>
-              <a:rPr lang="pt-BR" sz="1800" dirty="0">
-                <a:solidFill>
-                  <a:srgbClr val="000000"/>
-                </a:solidFill>
-                <a:highlight>
-                  <a:srgbClr val="FFFFFF"/>
-                </a:highlight>
-                <a:latin typeface="Consolas" panose="020B0609020204030204" pitchFamily="49" charset="0"/>
-              </a:rPr>
-              <a:t>	</a:t>
-            </a:r>
-            <a:r>
-              <a:rPr lang="de-DE" sz="1800" dirty="0" err="1">
-                <a:solidFill>
-                  <a:srgbClr val="000000"/>
-                </a:solidFill>
-                <a:highlight>
-                  <a:srgbClr val="FFFFFF"/>
-                </a:highlight>
-                <a:latin typeface="Consolas" panose="020B0609020204030204" pitchFamily="49" charset="0"/>
-              </a:rPr>
-              <a:t>Out_Color</a:t>
-            </a:r>
-            <a:r>
-              <a:rPr lang="de-DE" sz="1800" dirty="0">
-                <a:solidFill>
-                  <a:srgbClr val="000000"/>
-                </a:solidFill>
-                <a:highlight>
-                  <a:srgbClr val="FFFFFF"/>
-                </a:highlight>
-                <a:latin typeface="Consolas" panose="020B0609020204030204" pitchFamily="49" charset="0"/>
-              </a:rPr>
-              <a:t> = </a:t>
-            </a:r>
-            <a:r>
-              <a:rPr lang="de-DE" sz="1800" dirty="0" err="1">
-                <a:solidFill>
-                  <a:srgbClr val="800000"/>
-                </a:solidFill>
-                <a:highlight>
-                  <a:srgbClr val="FFFFFF"/>
-                </a:highlight>
-                <a:latin typeface="Consolas" panose="020B0609020204030204" pitchFamily="49" charset="0"/>
-              </a:rPr>
-              <a:t>max</a:t>
-            </a:r>
-            <a:r>
-              <a:rPr lang="de-DE" sz="1800" dirty="0">
-                <a:solidFill>
-                  <a:srgbClr val="000000"/>
-                </a:solidFill>
-                <a:highlight>
-                  <a:srgbClr val="FFFFFF"/>
-                </a:highlight>
-                <a:latin typeface="Consolas" panose="020B0609020204030204" pitchFamily="49" charset="0"/>
-              </a:rPr>
-              <a:t>(</a:t>
-            </a:r>
-            <a:r>
-              <a:rPr lang="de-DE" sz="1800" dirty="0" err="1">
-                <a:solidFill>
-                  <a:srgbClr val="800000"/>
-                </a:solidFill>
-                <a:highlight>
-                  <a:srgbClr val="FFFFFF"/>
-                </a:highlight>
-                <a:latin typeface="Consolas" panose="020B0609020204030204" pitchFamily="49" charset="0"/>
-              </a:rPr>
-              <a:t>texture</a:t>
-            </a:r>
-            <a:r>
-              <a:rPr lang="de-DE" sz="1800" dirty="0">
-                <a:solidFill>
-                  <a:srgbClr val="000000"/>
-                </a:solidFill>
-                <a:highlight>
-                  <a:srgbClr val="FFFFFF"/>
-                </a:highlight>
-                <a:latin typeface="Consolas" panose="020B0609020204030204" pitchFamily="49" charset="0"/>
-              </a:rPr>
-              <a:t>(tex0, </a:t>
-            </a:r>
-            <a:r>
-              <a:rPr lang="de-DE" sz="1800" dirty="0" err="1">
-                <a:solidFill>
-                  <a:srgbClr val="000000"/>
-                </a:solidFill>
-                <a:highlight>
-                  <a:srgbClr val="FFFFFF"/>
-                </a:highlight>
-                <a:latin typeface="Consolas" panose="020B0609020204030204" pitchFamily="49" charset="0"/>
-              </a:rPr>
-              <a:t>texCoord</a:t>
-            </a:r>
-            <a:r>
-              <a:rPr lang="de-DE" sz="1800" dirty="0">
-                <a:solidFill>
-                  <a:srgbClr val="000000"/>
-                </a:solidFill>
-                <a:highlight>
-                  <a:srgbClr val="FFFFFF"/>
-                </a:highlight>
-                <a:latin typeface="Consolas" panose="020B0609020204030204" pitchFamily="49" charset="0"/>
-              </a:rPr>
-              <a:t>) * </a:t>
+              <a:t>specular</a:t>
+            </a:r>
+            <a:r>
+              <a:rPr lang="de-DE" sz="1800" dirty="0" smtClean="0">
+                <a:solidFill>
+                  <a:srgbClr val="000000"/>
+                </a:solidFill>
+                <a:highlight>
+                  <a:srgbClr val="FFFFFF"/>
+                </a:highlight>
+                <a:latin typeface="Consolas" panose="020B0609020204030204" pitchFamily="49" charset="0"/>
+              </a:rPr>
+              <a:t>, </a:t>
             </a:r>
             <a:r>
               <a:rPr lang="de-DE" sz="1800" dirty="0" err="1" smtClean="0">
-                <a:solidFill>
-                  <a:srgbClr val="000000"/>
-                </a:solidFill>
-                <a:highlight>
-                  <a:srgbClr val="FFFFFF"/>
-                </a:highlight>
-                <a:latin typeface="Consolas" panose="020B0609020204030204" pitchFamily="49" charset="0"/>
-              </a:rPr>
-              <a:t>intensity</a:t>
-            </a:r>
-            <a:r>
-              <a:rPr lang="de-DE" sz="1800" dirty="0" smtClean="0">
-                <a:solidFill>
-                  <a:srgbClr val="000000"/>
-                </a:solidFill>
-                <a:highlight>
-                  <a:srgbClr val="FFFFFF"/>
-                </a:highlight>
-                <a:latin typeface="Consolas" panose="020B0609020204030204" pitchFamily="49" charset="0"/>
-              </a:rPr>
-              <a:t> + </a:t>
-            </a:r>
-            <a:r>
-              <a:rPr lang="pt-BR" sz="1800" dirty="0" smtClean="0">
-                <a:solidFill>
-                  <a:srgbClr val="000000"/>
-                </a:solidFill>
-                <a:highlight>
-                  <a:srgbClr val="FFFFFF"/>
-                </a:highlight>
-                <a:latin typeface="Consolas" panose="020B0609020204030204" pitchFamily="49" charset="0"/>
-              </a:rPr>
-              <a:t>specular</a:t>
-            </a:r>
-            <a:r>
-              <a:rPr lang="de-DE" sz="1800" dirty="0" smtClean="0">
-                <a:solidFill>
-                  <a:srgbClr val="000000"/>
-                </a:solidFill>
-                <a:highlight>
-                  <a:srgbClr val="FFFFFF"/>
-                </a:highlight>
-                <a:latin typeface="Consolas" panose="020B0609020204030204" pitchFamily="49" charset="0"/>
-              </a:rPr>
-              <a:t>, </a:t>
-            </a:r>
-            <a:r>
-              <a:rPr lang="de-DE" sz="1800" dirty="0" err="1">
                 <a:solidFill>
                   <a:srgbClr val="000000"/>
                 </a:solidFill>
@@ -16593,7 +16272,7 @@
                                         <p:tgtEl>
                                           <p:spTgt spid="3">
                                             <p:txEl>
-                                              <p:pRg st="4" end="4"/>
+                                              <p:pRg st="0" end="0"/>
                                             </p:txEl>
                                           </p:spTgt>
                                         </p:tgtEl>
@@ -16611,7 +16290,7 @@
                                         <p:tgtEl>
                                           <p:spTgt spid="3">
                                             <p:txEl>
-                                              <p:pRg st="4" end="4"/>
+                                              <p:pRg st="0" end="0"/>
                                             </p:txEl>
                                           </p:spTgt>
                                         </p:tgtEl>
@@ -16636,7 +16315,7 @@
                                         <p:tgtEl>
                                           <p:spTgt spid="3">
                                             <p:txEl>
-                                              <p:pRg st="5" end="5"/>
+                                              <p:pRg st="1" end="1"/>
                                             </p:txEl>
                                           </p:spTgt>
                                         </p:tgtEl>
@@ -16654,7 +16333,93 @@
                                         <p:tgtEl>
                                           <p:spTgt spid="3">
                                             <p:txEl>
-                                              <p:pRg st="5" end="5"/>
+                                              <p:pRg st="1" end="1"/>
+                                            </p:txEl>
+                                          </p:spTgt>
+                                        </p:tgtEl>
+                                      </p:cBhvr>
+                                    </p:animEffect>
+                                  </p:childTnLst>
+                                </p:cTn>
+                              </p:par>
+                              <p:par>
+                                <p:cTn id="11" presetID="10" presetClass="entr" presetSubtype="0" fill="hold" nodeType="withEffect">
+                                  <p:stCondLst>
+                                    <p:cond delay="0"/>
+                                  </p:stCondLst>
+                                  <p:childTnLst>
+                                    <p:set>
+                                      <p:cBhvr>
+                                        <p:cTn id="12" dur="1" fill="hold">
+                                          <p:stCondLst>
+                                            <p:cond delay="0"/>
+                                          </p:stCondLst>
+                                        </p:cTn>
+                                        <p:tgtEl>
+                                          <p:spTgt spid="3">
+                                            <p:txEl>
+                                              <p:pRg st="2" end="2"/>
+                                            </p:txEl>
+                                          </p:spTgt>
+                                        </p:tgtEl>
+                                        <p:attrNameLst>
+                                          <p:attrName>style.visibility</p:attrName>
+                                        </p:attrNameLst>
+                                      </p:cBhvr>
+                                      <p:to>
+                                        <p:strVal val="visible"/>
+                                      </p:to>
+                                    </p:set>
+                                    <p:animEffect transition="in" filter="fade">
+                                      <p:cBhvr>
+                                        <p:cTn id="13" dur="500"/>
+                                        <p:tgtEl>
+                                          <p:spTgt spid="3">
+                                            <p:txEl>
+                                              <p:pRg st="2" end="2"/>
+                                            </p:txEl>
+                                          </p:spTgt>
+                                        </p:tgtEl>
+                                      </p:cBhvr>
+                                    </p:animEffect>
+                                  </p:childTnLst>
+                                </p:cTn>
+                              </p:par>
+                              <p:par>
+                                <p:cTn id="14" presetID="10" presetClass="entr" presetSubtype="0" fill="hold" nodeType="withEffect">
+                                  <p:stCondLst>
+                                    <p:cond delay="0"/>
+                                  </p:stCondLst>
+                                  <p:childTnLst>
+                                    <p:set>
+                                      <p:cBhvr>
+                                        <p:cTn id="15" dur="1" fill="hold">
+                                          <p:stCondLst>
+                                            <p:cond delay="0"/>
+                                          </p:stCondLst>
+                                        </p:cTn>
+                                        <p:tgtEl>
+                                          <p:spTgt spid="3">
+                                            <p:txEl>
+                                              <p:pRg st="3" end="3"/>
+                                            </p:txEl>
+                                          </p:spTgt>
+                                        </p:tgtEl>
+                                        <p:attrNameLst>
+                                          <p:attrName>style.visibility</p:attrName>
+                                        </p:attrNameLst>
+                                      </p:cBhvr>
+                                      <p:to>
+                                        <p:strVal val="visible"/>
+                                      </p:to>
+                                    </p:set>
+                                    <p:animEffect transition="in" filter="fade">
+                                      <p:cBhvr>
+                                        <p:cTn id="16" dur="500"/>
+                                        <p:tgtEl>
+                                          <p:spTgt spid="3">
+                                            <p:txEl>
+                                              <p:pRg st="3" end="3"/>
                                             </p:txEl>
                                           </p:spTgt>
                                         </p:tgtEl>
@@ -16670,26 +16435,26 @@
                     </p:cTn>
                   </p:par>
                   <p:par>
-                    <p:cTn id="11" fill="hold">
+                    <p:cTn id="17" fill="hold">
                       <p:stCondLst>
                         <p:cond delay="indefinite"/>
                       </p:stCondLst>
                       <p:childTnLst>
                         <p:par>
-                          <p:cTn id="12" fill="hold">
+                          <p:cTn id="18" fill="hold">
                             <p:stCondLst>
                               <p:cond delay="0"/>
                             </p:stCondLst>
                             <p:childTnLst>
                               <p:par>
-                                <p:cTn id="13" presetID="10" presetClass="entr" presetSubtype="0" fill="hold" nodeType="clickEffect">
+                                <p:cTn id="19" presetID="10" presetClass="entr" presetSubtype="0" fill="hold" nodeType="clickEffect">
                                   <p:stCondLst>
                                     <p:cond delay="0"/>
                                   </p:stCondLst>
                                   <p:childTnLst>
                                     <p:set>
                                       <p:cBhvr>
-                                        <p:cTn id="14" dur="1" fill="hold">
+                                        <p:cTn id="20" dur="1" fill="hold">
                                           <p:stCondLst>
                                             <p:cond delay="0"/>
                                           </p:stCondLst>
@@ -16697,7 +16462,7 @@
                                         <p:tgtEl>
                                           <p:spTgt spid="3">
                                             <p:txEl>
-                                              <p:pRg st="6" end="6"/>
+                                              <p:pRg st="8" end="8"/>
                                             </p:txEl>
                                           </p:spTgt>
                                         </p:tgtEl>
@@ -16711,11 +16476,133 @@
                                     </p:set>
                                     <p:animEffect transition="in" filter="fade">
                                       <p:cBhvr>
-                                        <p:cTn id="15" dur="500"/>
+                                        <p:cTn id="21" dur="500"/>
                                         <p:tgtEl>
                                           <p:spTgt spid="3">
                                             <p:txEl>
-                                              <p:pRg st="6" end="6"/>
+                                              <p:pRg st="8" end="8"/>
+                                            </p:txEl>
+                                          </p:spTgt>
+                                        </p:tgtEl>
+                                      </p:cBhvr>
+                                    </p:animEffect>
+                                  </p:childTnLst>
+                                </p:cTn>
+                              </p:par>
+                            </p:childTnLst>
+                          </p:cTn>
+                        </p:par>
+                      </p:childTnLst>
+                    </p:cTn>
+                  </p:par>
+                  <p:par>
+                    <p:cTn id="22" fill="hold">
+                      <p:stCondLst>
+                        <p:cond delay="indefinite"/>
+                      </p:stCondLst>
+                      <p:childTnLst>
+                        <p:par>
+                          <p:cTn id="23" fill="hold">
+                            <p:stCondLst>
+                              <p:cond delay="0"/>
+                            </p:stCondLst>
+                            <p:childTnLst>
+                              <p:par>
+                                <p:cTn id="24" presetID="10" presetClass="entr" presetSubtype="0" fill="hold" nodeType="clickEffect">
+                                  <p:stCondLst>
+                                    <p:cond delay="0"/>
+                                  </p:stCondLst>
+                                  <p:childTnLst>
+                                    <p:set>
+                                      <p:cBhvr>
+                                        <p:cTn id="25" dur="1" fill="hold">
+                                          <p:stCondLst>
+                                            <p:cond delay="0"/>
+                                          </p:stCondLst>
+                                        </p:cTn>
+                                        <p:tgtEl>
+                                          <p:spTgt spid="3">
+                                            <p:txEl>
+                                              <p:pRg st="9" end="9"/>
+                                            </p:txEl>
+                                          </p:spTgt>
+                                        </p:tgtEl>
+                                        <p:attrNameLst>
+                                          <p:attrName>style.visibility</p:attrName>
+                                        </p:attrNameLst>
+                                      </p:cBhvr>
+                                      <p:to>
+                                        <p:strVal val="visible"/>
+                                      </p:to>
+                                    </p:set>
+                                    <p:animEffect transition="in" filter="fade">
+                                      <p:cBhvr>
+                                        <p:cTn id="26" dur="500"/>
+                                        <p:tgtEl>
+                                          <p:spTgt spid="3">
+                                            <p:txEl>
+                                              <p:pRg st="9" end="9"/>
+                                            </p:txEl>
+                                          </p:spTgt>
+                                        </p:tgtEl>
+                                      </p:cBhvr>
+                                    </p:animEffect>
+                                  </p:childTnLst>
+                                </p:cTn>
+                              </p:par>
+                            </p:childTnLst>
+                          </p:cTn>
+                        </p:par>
+                      </p:childTnLst>
+                    </p:cTn>
+                  </p:par>
+                  <p:par>
+                    <p:cTn id="27" fill="hold">
+                      <p:stCondLst>
+                        <p:cond delay="indefinite"/>
+                      </p:stCondLst>
+                      <p:childTnLst>
+                        <p:par>
+                          <p:cTn id="28" fill="hold">
+                            <p:stCondLst>
+                              <p:cond delay="0"/>
+                            </p:stCondLst>
+                            <p:childTnLst>
+                              <p:par>
+                                <p:cTn id="29" presetID="10" presetClass="entr" presetSubtype="0" fill="hold" nodeType="clickEffect">
+                                  <p:stCondLst>
+                                    <p:cond delay="0"/>
+                                  </p:stCondLst>
+                                  <p:childTnLst>
+                                    <p:set>
+                                      <p:cBhvr>
+                                        <p:cTn id="30" dur="1" fill="hold">
+                                          <p:stCondLst>
+                                            <p:cond delay="0"/>
+                                          </p:stCondLst>
+                                        </p:cTn>
+                                        <p:tgtEl>
+                                          <p:spTgt spid="3">
+                                            <p:txEl>
+                                              <p:pRg st="10" end="10"/>
+                                            </p:txEl>
+                                          </p:spTgt>
+                                        </p:tgtEl>
+                                        <p:attrNameLst>
+                                          <p:attrName>style.visibility</p:attrName>
+                                        </p:attrNameLst>
+                                      </p:cBhvr>
+                                      <p:to>
+                                        <p:strVal val="visible"/>
+                                      </p:to>
+                                    </p:set>
+                                    <p:animEffect transition="in" filter="fade">
+                                      <p:cBhvr>
+                                        <p:cTn id="31" dur="500"/>
+                                        <p:tgtEl>
+                                          <p:spTgt spid="3">
+                                            <p:txEl>
+                                              <p:pRg st="10" end="10"/>
                                             </p:txEl>
                                           </p:spTgt>
                                         </p:tgtEl>
@@ -19503,11 +19390,7 @@
             </a:r>
             <a:r>
               <a:rPr lang="de-DE" dirty="0" smtClean="0"/>
-              <a:t> </a:t>
-            </a:r>
-            <a:r>
-              <a:rPr lang="de-DE" dirty="0" smtClean="0"/>
-              <a:t>– </a:t>
+              <a:t> – </a:t>
             </a:r>
             <a:r>
               <a:rPr lang="de-DE" dirty="0" err="1" smtClean="0"/>
@@ -20081,11 +19964,7 @@
             </a:r>
             <a:r>
               <a:rPr lang="de-DE" dirty="0" smtClean="0"/>
-              <a:t> </a:t>
-            </a:r>
-            <a:r>
-              <a:rPr lang="de-DE" dirty="0" smtClean="0"/>
-              <a:t>– </a:t>
+              <a:t> – </a:t>
             </a:r>
             <a:r>
               <a:rPr lang="de-DE" dirty="0" err="1" smtClean="0"/>

</xml_diff>

<commit_message>
[TASK] Makes normal mapping easier
</commit_message>
<xml_diff>
--- a/Talk/Shading & Lightning.pptx
+++ b/Talk/Shading & Lightning.pptx
@@ -13304,6 +13304,68 @@
               <a:t>1</a:t>
             </a:r>
             <a:r>
+              <a:rPr lang="de-DE" sz="1700" dirty="0" smtClean="0">
+                <a:solidFill>
+                  <a:srgbClr val="000000"/>
+                </a:solidFill>
+                <a:highlight>
+                  <a:srgbClr val="FFFFFF"/>
+                </a:highlight>
+                <a:latin typeface="Consolas" panose="020B0609020204030204" pitchFamily="49" charset="0"/>
+              </a:rPr>
+              <a:t>);</a:t>
+            </a:r>
+          </a:p>
+          <a:p>
+            <a:r>
+              <a:rPr lang="de-DE" sz="1700" dirty="0" smtClean="0">
+                <a:solidFill>
+                  <a:srgbClr val="000000"/>
+                </a:solidFill>
+                <a:highlight>
+                  <a:srgbClr val="FFFFFF"/>
+                </a:highlight>
+                <a:latin typeface="Consolas" panose="020B0609020204030204" pitchFamily="49" charset="0"/>
+              </a:rPr>
+              <a:t> </a:t>
+            </a:r>
+            <a:r>
+              <a:rPr lang="de-DE" sz="1700" dirty="0" smtClean="0">
+                <a:solidFill>
+                  <a:srgbClr val="000000"/>
+                </a:solidFill>
+                <a:highlight>
+                  <a:srgbClr val="FFFFFF"/>
+                </a:highlight>
+                <a:latin typeface="Consolas" panose="020B0609020204030204" pitchFamily="49" charset="0"/>
+              </a:rPr>
+              <a:t>	</a:t>
+            </a:r>
+            <a:r>
+              <a:rPr lang="de-DE" sz="1700" dirty="0" smtClean="0">
+                <a:solidFill>
+                  <a:srgbClr val="008000"/>
+                </a:solidFill>
+                <a:highlight>
+                  <a:srgbClr val="FFFFFF"/>
+                </a:highlight>
+                <a:latin typeface="Consolas" panose="020B0609020204030204" pitchFamily="49" charset="0"/>
+              </a:rPr>
+              <a:t>vec4 </a:t>
+            </a:r>
+            <a:r>
+              <a:rPr lang="de-DE" sz="1700" dirty="0" smtClean="0">
+                <a:solidFill>
+                  <a:srgbClr val="000000"/>
+                </a:solidFill>
+                <a:highlight>
+                  <a:srgbClr val="FFFFFF"/>
+                </a:highlight>
+                <a:latin typeface="Consolas" panose="020B0609020204030204" pitchFamily="49" charset="0"/>
+              </a:rPr>
+              <a:t>n </a:t>
+            </a:r>
+            <a:r>
               <a:rPr lang="de-DE" sz="1700" dirty="0">
                 <a:solidFill>
                   <a:srgbClr val="000000"/>
@@ -13313,27 +13375,70 @@
                 </a:highlight>
                 <a:latin typeface="Consolas" panose="020B0609020204030204" pitchFamily="49" charset="0"/>
               </a:rPr>
-              <a:t>);</a:t>
-            </a:r>
-          </a:p>
-          <a:p>
-            <a:pPr marL="0" indent="0">
-              <a:buNone/>
-            </a:pPr>
-            <a:r>
-              <a:rPr lang="de-DE" sz="1700" dirty="0" smtClean="0">
-                <a:solidFill>
-                  <a:srgbClr val="008000"/>
-                </a:solidFill>
-                <a:highlight>
-                  <a:srgbClr val="FFFFFF"/>
-                </a:highlight>
-                <a:latin typeface="Consolas" panose="020B0609020204030204" pitchFamily="49" charset="0"/>
-              </a:rPr>
-              <a:t>	mat4</a:t>
-            </a:r>
-            <a:r>
-              <a:rPr lang="de-DE" sz="1700" dirty="0" smtClean="0">
+              <a:t>= </a:t>
+            </a:r>
+            <a:r>
+              <a:rPr lang="de-DE" sz="1800" b="1" dirty="0" err="1">
+                <a:solidFill>
+                  <a:srgbClr val="800000"/>
+                </a:solidFill>
+                <a:highlight>
+                  <a:srgbClr val="FFFFFF"/>
+                </a:highlight>
+                <a:latin typeface="Consolas" panose="020B0609020204030204" pitchFamily="49" charset="0"/>
+              </a:rPr>
+              <a:t>normalize</a:t>
+            </a:r>
+            <a:r>
+              <a:rPr lang="de-DE" sz="1800" dirty="0">
+                <a:solidFill>
+                  <a:srgbClr val="000000"/>
+                </a:solidFill>
+                <a:highlight>
+                  <a:srgbClr val="FFFFFF"/>
+                </a:highlight>
+                <a:latin typeface="Consolas" panose="020B0609020204030204" pitchFamily="49" charset="0"/>
+              </a:rPr>
+              <a:t>(</a:t>
+            </a:r>
+            <a:r>
+              <a:rPr lang="de-DE" sz="1800" dirty="0" err="1">
+                <a:solidFill>
+                  <a:srgbClr val="000000"/>
+                </a:solidFill>
+                <a:highlight>
+                  <a:srgbClr val="FFFFFF"/>
+                </a:highlight>
+                <a:latin typeface="Consolas" panose="020B0609020204030204" pitchFamily="49" charset="0"/>
+              </a:rPr>
+              <a:t>tangent</a:t>
+            </a:r>
+            <a:r>
+              <a:rPr lang="de-DE" sz="1800" dirty="0">
+                <a:solidFill>
+                  <a:srgbClr val="000000"/>
+                </a:solidFill>
+                <a:highlight>
+                  <a:srgbClr val="FFFFFF"/>
+                </a:highlight>
+                <a:latin typeface="Consolas" panose="020B0609020204030204" pitchFamily="49" charset="0"/>
+              </a:rPr>
+              <a:t>) * </a:t>
+            </a:r>
+            <a:r>
+              <a:rPr lang="de-DE" sz="1800" dirty="0" err="1" smtClean="0">
+                <a:solidFill>
+                  <a:srgbClr val="000000"/>
+                </a:solidFill>
+                <a:highlight>
+                  <a:srgbClr val="FFFFFF"/>
+                </a:highlight>
+                <a:latin typeface="Consolas" panose="020B0609020204030204" pitchFamily="49" charset="0"/>
+              </a:rPr>
+              <a:t>bump.r</a:t>
+            </a:r>
+            <a:r>
+              <a:rPr lang="de-DE" sz="1800" dirty="0" smtClean="0">
                 <a:solidFill>
                   <a:srgbClr val="000000"/>
                 </a:solidFill>
@@ -13345,162 +13450,18 @@
               <a:t> </a:t>
             </a:r>
             <a:r>
-              <a:rPr lang="de-DE" sz="1700" dirty="0">
-                <a:solidFill>
-                  <a:srgbClr val="000000"/>
-                </a:solidFill>
-                <a:highlight>
-                  <a:srgbClr val="FFFFFF"/>
-                </a:highlight>
-                <a:latin typeface="Consolas" panose="020B0609020204030204" pitchFamily="49" charset="0"/>
-              </a:rPr>
-              <a:t>TBN = </a:t>
-            </a:r>
-            <a:r>
-              <a:rPr lang="de-DE" sz="1700" dirty="0" smtClean="0">
-                <a:solidFill>
-                  <a:srgbClr val="008000"/>
-                </a:solidFill>
-                <a:highlight>
-                  <a:srgbClr val="FFFFFF"/>
-                </a:highlight>
-                <a:latin typeface="Consolas" panose="020B0609020204030204" pitchFamily="49" charset="0"/>
-              </a:rPr>
-              <a:t>mat4</a:t>
-            </a:r>
-            <a:r>
-              <a:rPr lang="de-DE" sz="1700" dirty="0" smtClean="0">
-                <a:solidFill>
-                  <a:srgbClr val="000000"/>
-                </a:solidFill>
-                <a:highlight>
-                  <a:srgbClr val="FFFFFF"/>
-                </a:highlight>
-                <a:latin typeface="Consolas" panose="020B0609020204030204" pitchFamily="49" charset="0"/>
-              </a:rPr>
-              <a:t>(</a:t>
-            </a:r>
-            <a:r>
-              <a:rPr lang="de-DE" sz="1700" b="1" dirty="0" err="1" smtClean="0">
-                <a:solidFill>
-                  <a:srgbClr val="800000"/>
-                </a:solidFill>
-                <a:highlight>
-                  <a:srgbClr val="FFFFFF"/>
-                </a:highlight>
-                <a:latin typeface="Consolas" panose="020B0609020204030204" pitchFamily="49" charset="0"/>
-              </a:rPr>
-              <a:t>normalize</a:t>
-            </a:r>
-            <a:r>
-              <a:rPr lang="de-DE" sz="1700" dirty="0" smtClean="0">
-                <a:solidFill>
-                  <a:srgbClr val="000000"/>
-                </a:solidFill>
-                <a:highlight>
-                  <a:srgbClr val="FFFFFF"/>
-                </a:highlight>
-                <a:latin typeface="Consolas" panose="020B0609020204030204" pitchFamily="49" charset="0"/>
-              </a:rPr>
-              <a:t>(</a:t>
-            </a:r>
-            <a:r>
-              <a:rPr lang="de-DE" sz="1700" dirty="0" err="1" smtClean="0">
-                <a:solidFill>
-                  <a:srgbClr val="000000"/>
-                </a:solidFill>
-                <a:highlight>
-                  <a:srgbClr val="FFFFFF"/>
-                </a:highlight>
-                <a:latin typeface="Consolas" panose="020B0609020204030204" pitchFamily="49" charset="0"/>
-              </a:rPr>
-              <a:t>tangent</a:t>
-            </a:r>
-            <a:r>
-              <a:rPr lang="de-DE" sz="1700" dirty="0">
-                <a:solidFill>
-                  <a:srgbClr val="000000"/>
-                </a:solidFill>
-                <a:highlight>
-                  <a:srgbClr val="FFFFFF"/>
-                </a:highlight>
-                <a:latin typeface="Consolas" panose="020B0609020204030204" pitchFamily="49" charset="0"/>
-              </a:rPr>
-              <a:t>), </a:t>
-            </a:r>
-            <a:r>
-              <a:rPr lang="de-DE" sz="1700" b="1" dirty="0" err="1">
-                <a:solidFill>
-                  <a:srgbClr val="800000"/>
-                </a:solidFill>
-                <a:highlight>
-                  <a:srgbClr val="FFFFFF"/>
-                </a:highlight>
-                <a:latin typeface="Consolas" panose="020B0609020204030204" pitchFamily="49" charset="0"/>
-              </a:rPr>
-              <a:t>normalize</a:t>
-            </a:r>
-            <a:r>
-              <a:rPr lang="de-DE" sz="1700" dirty="0">
-                <a:solidFill>
-                  <a:srgbClr val="000000"/>
-                </a:solidFill>
-                <a:highlight>
-                  <a:srgbClr val="FFFFFF"/>
-                </a:highlight>
-                <a:latin typeface="Consolas" panose="020B0609020204030204" pitchFamily="49" charset="0"/>
-              </a:rPr>
-              <a:t>(</a:t>
-            </a:r>
-            <a:r>
-              <a:rPr lang="de-DE" sz="1700" dirty="0" err="1">
-                <a:solidFill>
-                  <a:srgbClr val="000000"/>
-                </a:solidFill>
-                <a:highlight>
-                  <a:srgbClr val="FFFFFF"/>
-                </a:highlight>
-                <a:latin typeface="Consolas" panose="020B0609020204030204" pitchFamily="49" charset="0"/>
-              </a:rPr>
-              <a:t>bitangent</a:t>
-            </a:r>
-            <a:r>
-              <a:rPr lang="de-DE" sz="1700" dirty="0" smtClean="0">
-                <a:solidFill>
-                  <a:srgbClr val="000000"/>
-                </a:solidFill>
-                <a:highlight>
-                  <a:srgbClr val="FFFFFF"/>
-                </a:highlight>
-                <a:latin typeface="Consolas" panose="020B0609020204030204" pitchFamily="49" charset="0"/>
-              </a:rPr>
-              <a:t>), </a:t>
-            </a:r>
-            <a:r>
-              <a:rPr lang="de-DE" sz="1700" b="1" dirty="0" err="1" smtClean="0">
-                <a:solidFill>
-                  <a:srgbClr val="800000"/>
-                </a:solidFill>
-                <a:highlight>
-                  <a:srgbClr val="FFFFFF"/>
-                </a:highlight>
-                <a:latin typeface="Consolas" panose="020B0609020204030204" pitchFamily="49" charset="0"/>
-              </a:rPr>
-              <a:t>normalize</a:t>
-            </a:r>
-            <a:r>
-              <a:rPr lang="de-DE" sz="1700" dirty="0" smtClean="0">
-                <a:solidFill>
-                  <a:srgbClr val="000000"/>
-                </a:solidFill>
-                <a:highlight>
-                  <a:srgbClr val="FFFFFF"/>
-                </a:highlight>
-                <a:latin typeface="Consolas" panose="020B0609020204030204" pitchFamily="49" charset="0"/>
-              </a:rPr>
-              <a:t>(normal));</a:t>
-            </a:r>
-            <a:endParaRPr lang="de-DE" sz="1700" dirty="0">
+              <a:rPr lang="de-DE" sz="1800" dirty="0">
+                <a:solidFill>
+                  <a:srgbClr val="000000"/>
+                </a:solidFill>
+                <a:highlight>
+                  <a:srgbClr val="FFFFFF"/>
+                </a:highlight>
+                <a:latin typeface="Consolas" panose="020B0609020204030204" pitchFamily="49" charset="0"/>
+              </a:rPr>
+              <a:t>+ </a:t>
+            </a:r>
+            <a:endParaRPr lang="de-DE" sz="1800" dirty="0" smtClean="0">
               <a:solidFill>
                 <a:srgbClr val="000000"/>
               </a:solidFill>
@@ -13515,6 +13476,188 @@
               <a:buNone/>
             </a:pPr>
             <a:r>
+              <a:rPr lang="de-DE" sz="1800" b="1" dirty="0" smtClean="0">
+                <a:solidFill>
+                  <a:srgbClr val="800000"/>
+                </a:solidFill>
+                <a:highlight>
+                  <a:srgbClr val="FFFFFF"/>
+                </a:highlight>
+                <a:latin typeface="Consolas" panose="020B0609020204030204" pitchFamily="49" charset="0"/>
+              </a:rPr>
+              <a:t>		 </a:t>
+            </a:r>
+            <a:r>
+              <a:rPr lang="de-DE" sz="1800" b="1" dirty="0" err="1" smtClean="0">
+                <a:solidFill>
+                  <a:srgbClr val="800000"/>
+                </a:solidFill>
+                <a:highlight>
+                  <a:srgbClr val="FFFFFF"/>
+                </a:highlight>
+                <a:latin typeface="Consolas" panose="020B0609020204030204" pitchFamily="49" charset="0"/>
+              </a:rPr>
+              <a:t>normalize</a:t>
+            </a:r>
+            <a:r>
+              <a:rPr lang="de-DE" sz="1800" dirty="0" smtClean="0">
+                <a:solidFill>
+                  <a:srgbClr val="000000"/>
+                </a:solidFill>
+                <a:highlight>
+                  <a:srgbClr val="FFFFFF"/>
+                </a:highlight>
+                <a:latin typeface="Consolas" panose="020B0609020204030204" pitchFamily="49" charset="0"/>
+              </a:rPr>
+              <a:t>(</a:t>
+            </a:r>
+            <a:r>
+              <a:rPr lang="de-DE" sz="1800" dirty="0" err="1" smtClean="0">
+                <a:solidFill>
+                  <a:srgbClr val="000000"/>
+                </a:solidFill>
+                <a:highlight>
+                  <a:srgbClr val="FFFFFF"/>
+                </a:highlight>
+                <a:latin typeface="Consolas" panose="020B0609020204030204" pitchFamily="49" charset="0"/>
+              </a:rPr>
+              <a:t>bitangent</a:t>
+            </a:r>
+            <a:r>
+              <a:rPr lang="de-DE" sz="1800" dirty="0">
+                <a:solidFill>
+                  <a:srgbClr val="000000"/>
+                </a:solidFill>
+                <a:highlight>
+                  <a:srgbClr val="FFFFFF"/>
+                </a:highlight>
+                <a:latin typeface="Consolas" panose="020B0609020204030204" pitchFamily="49" charset="0"/>
+              </a:rPr>
+              <a:t>) * </a:t>
+            </a:r>
+            <a:r>
+              <a:rPr lang="de-DE" sz="1800" dirty="0" err="1" smtClean="0">
+                <a:solidFill>
+                  <a:srgbClr val="000000"/>
+                </a:solidFill>
+                <a:highlight>
+                  <a:srgbClr val="FFFFFF"/>
+                </a:highlight>
+                <a:latin typeface="Consolas" panose="020B0609020204030204" pitchFamily="49" charset="0"/>
+              </a:rPr>
+              <a:t>bump.g</a:t>
+            </a:r>
+            <a:r>
+              <a:rPr lang="de-DE" sz="1800" dirty="0" smtClean="0">
+                <a:solidFill>
+                  <a:srgbClr val="000000"/>
+                </a:solidFill>
+                <a:highlight>
+                  <a:srgbClr val="FFFFFF"/>
+                </a:highlight>
+                <a:latin typeface="Consolas" panose="020B0609020204030204" pitchFamily="49" charset="0"/>
+              </a:rPr>
+              <a:t> </a:t>
+            </a:r>
+            <a:r>
+              <a:rPr lang="de-DE" sz="1800" dirty="0">
+                <a:solidFill>
+                  <a:srgbClr val="000000"/>
+                </a:solidFill>
+                <a:highlight>
+                  <a:srgbClr val="FFFFFF"/>
+                </a:highlight>
+                <a:latin typeface="Consolas" panose="020B0609020204030204" pitchFamily="49" charset="0"/>
+              </a:rPr>
+              <a:t>+ </a:t>
+            </a:r>
+            <a:endParaRPr lang="de-DE" sz="1800" dirty="0" smtClean="0">
+              <a:solidFill>
+                <a:srgbClr val="000000"/>
+              </a:solidFill>
+              <a:highlight>
+                <a:srgbClr val="FFFFFF"/>
+              </a:highlight>
+              <a:latin typeface="Consolas" panose="020B0609020204030204" pitchFamily="49" charset="0"/>
+            </a:endParaRPr>
+          </a:p>
+          <a:p>
+            <a:pPr marL="0" indent="0">
+              <a:buNone/>
+            </a:pPr>
+            <a:r>
+              <a:rPr lang="de-DE" sz="1800" b="1" dirty="0">
+                <a:solidFill>
+                  <a:srgbClr val="000000"/>
+                </a:solidFill>
+                <a:highlight>
+                  <a:srgbClr val="FFFFFF"/>
+                </a:highlight>
+                <a:latin typeface="Consolas" panose="020B0609020204030204" pitchFamily="49" charset="0"/>
+              </a:rPr>
+              <a:t>	</a:t>
+            </a:r>
+            <a:r>
+              <a:rPr lang="de-DE" sz="1800" b="1" dirty="0" smtClean="0">
+                <a:solidFill>
+                  <a:srgbClr val="000000"/>
+                </a:solidFill>
+                <a:highlight>
+                  <a:srgbClr val="FFFFFF"/>
+                </a:highlight>
+                <a:latin typeface="Consolas" panose="020B0609020204030204" pitchFamily="49" charset="0"/>
+              </a:rPr>
+              <a:t>	 </a:t>
+            </a:r>
+            <a:r>
+              <a:rPr lang="de-DE" sz="1800" b="1" dirty="0" err="1" smtClean="0">
+                <a:solidFill>
+                  <a:srgbClr val="800000"/>
+                </a:solidFill>
+                <a:highlight>
+                  <a:srgbClr val="FFFFFF"/>
+                </a:highlight>
+                <a:latin typeface="Consolas" panose="020B0609020204030204" pitchFamily="49" charset="0"/>
+              </a:rPr>
+              <a:t>normalize</a:t>
+            </a:r>
+            <a:r>
+              <a:rPr lang="de-DE" sz="1800" dirty="0" smtClean="0">
+                <a:solidFill>
+                  <a:srgbClr val="000000"/>
+                </a:solidFill>
+                <a:highlight>
+                  <a:srgbClr val="FFFFFF"/>
+                </a:highlight>
+                <a:latin typeface="Consolas" panose="020B0609020204030204" pitchFamily="49" charset="0"/>
+              </a:rPr>
+              <a:t>(normal) </a:t>
+            </a:r>
+            <a:r>
+              <a:rPr lang="de-DE" sz="1800" dirty="0">
+                <a:solidFill>
+                  <a:srgbClr val="000000"/>
+                </a:solidFill>
+                <a:highlight>
+                  <a:srgbClr val="FFFFFF"/>
+                </a:highlight>
+                <a:latin typeface="Consolas" panose="020B0609020204030204" pitchFamily="49" charset="0"/>
+              </a:rPr>
+              <a:t>* </a:t>
+            </a:r>
+            <a:r>
+              <a:rPr lang="de-DE" sz="1800" dirty="0" err="1" smtClean="0">
+                <a:solidFill>
+                  <a:srgbClr val="000000"/>
+                </a:solidFill>
+                <a:highlight>
+                  <a:srgbClr val="FFFFFF"/>
+                </a:highlight>
+                <a:latin typeface="Consolas" panose="020B0609020204030204" pitchFamily="49" charset="0"/>
+              </a:rPr>
+              <a:t>bump.b</a:t>
+            </a:r>
+            <a:r>
               <a:rPr lang="de-DE" sz="1700" dirty="0" smtClean="0">
                 <a:solidFill>
                   <a:srgbClr val="000000"/>
@@ -13524,46 +13667,39 @@
                 </a:highlight>
                 <a:latin typeface="Consolas" panose="020B0609020204030204" pitchFamily="49" charset="0"/>
               </a:rPr>
+              <a:t>;</a:t>
+            </a:r>
+          </a:p>
+          <a:p>
+            <a:pPr marL="0" indent="0">
+              <a:buNone/>
+            </a:pPr>
+            <a:r>
+              <a:rPr lang="de-DE" sz="1700" dirty="0">
+                <a:solidFill>
+                  <a:srgbClr val="000000"/>
+                </a:solidFill>
+                <a:highlight>
+                  <a:srgbClr val="FFFFFF"/>
+                </a:highlight>
+                <a:latin typeface="Consolas" panose="020B0609020204030204" pitchFamily="49" charset="0"/>
+              </a:rPr>
               <a:t>	</a:t>
             </a:r>
             <a:r>
-              <a:rPr lang="de-DE" sz="1700" dirty="0" smtClean="0">
-                <a:solidFill>
-                  <a:srgbClr val="008000"/>
-                </a:solidFill>
-                <a:highlight>
-                  <a:srgbClr val="FFFFFF"/>
-                </a:highlight>
-                <a:latin typeface="Consolas" panose="020B0609020204030204" pitchFamily="49" charset="0"/>
-              </a:rPr>
-              <a:t>vec4 </a:t>
-            </a:r>
-            <a:r>
-              <a:rPr lang="de-DE" sz="1700" dirty="0" smtClean="0">
-                <a:solidFill>
-                  <a:srgbClr val="000000"/>
-                </a:solidFill>
-                <a:highlight>
-                  <a:srgbClr val="FFFFFF"/>
-                </a:highlight>
-                <a:latin typeface="Consolas" panose="020B0609020204030204" pitchFamily="49" charset="0"/>
-              </a:rPr>
-              <a:t>n </a:t>
-            </a:r>
-            <a:r>
-              <a:rPr lang="de-DE" sz="1700" dirty="0">
-                <a:solidFill>
-                  <a:srgbClr val="000000"/>
-                </a:solidFill>
-                <a:highlight>
-                  <a:srgbClr val="FFFFFF"/>
-                </a:highlight>
-                <a:latin typeface="Consolas" panose="020B0609020204030204" pitchFamily="49" charset="0"/>
-              </a:rPr>
-              <a:t>= </a:t>
-            </a:r>
-            <a:r>
-              <a:rPr lang="de-DE" sz="1700" b="1" dirty="0" err="1" smtClean="0">
+              <a:rPr lang="de-DE" sz="1600" dirty="0">
+                <a:solidFill>
+                  <a:srgbClr val="000000"/>
+                </a:solidFill>
+                <a:highlight>
+                  <a:srgbClr val="FFFFFF"/>
+                </a:highlight>
+                <a:latin typeface="Consolas" panose="020B0609020204030204" pitchFamily="49" charset="0"/>
+              </a:rPr>
+              <a:t>n = </a:t>
+            </a:r>
+            <a:r>
+              <a:rPr lang="de-DE" sz="1600" b="1" dirty="0" err="1" smtClean="0">
                 <a:solidFill>
                   <a:srgbClr val="800000"/>
                 </a:solidFill>
@@ -13575,41 +13711,26 @@
               <a:t>normalize</a:t>
             </a:r>
             <a:r>
-              <a:rPr lang="de-DE" sz="1700" dirty="0" smtClean="0">
-                <a:solidFill>
-                  <a:srgbClr val="000000"/>
-                </a:solidFill>
-                <a:highlight>
-                  <a:srgbClr val="FFFFFF"/>
-                </a:highlight>
-                <a:latin typeface="Consolas" panose="020B0609020204030204" pitchFamily="49" charset="0"/>
-              </a:rPr>
-              <a:t>(TBN * </a:t>
-            </a:r>
-            <a:r>
-              <a:rPr lang="de-DE" sz="1700" dirty="0" err="1" smtClean="0">
-                <a:solidFill>
-                  <a:srgbClr val="000000"/>
-                </a:solidFill>
-                <a:highlight>
-                  <a:srgbClr val="FFFFFF"/>
-                </a:highlight>
-                <a:latin typeface="Consolas" panose="020B0609020204030204" pitchFamily="49" charset="0"/>
-              </a:rPr>
-              <a:t>bump</a:t>
-            </a:r>
-            <a:r>
-              <a:rPr lang="de-DE" sz="1700" dirty="0" smtClean="0">
-                <a:solidFill>
-                  <a:srgbClr val="000000"/>
-                </a:solidFill>
-                <a:highlight>
-                  <a:srgbClr val="FFFFFF"/>
-                </a:highlight>
-                <a:latin typeface="Consolas" panose="020B0609020204030204" pitchFamily="49" charset="0"/>
-              </a:rPr>
-              <a:t>);</a:t>
-            </a:r>
+              <a:rPr lang="de-DE" sz="1600" dirty="0" smtClean="0">
+                <a:solidFill>
+                  <a:srgbClr val="000000"/>
+                </a:solidFill>
+                <a:highlight>
+                  <a:srgbClr val="FFFFFF"/>
+                </a:highlight>
+                <a:latin typeface="Consolas" panose="020B0609020204030204" pitchFamily="49" charset="0"/>
+              </a:rPr>
+              <a:t>(n);</a:t>
+            </a:r>
+            <a:endParaRPr lang="de-DE" sz="1500" dirty="0" smtClean="0">
+              <a:solidFill>
+                <a:srgbClr val="000000"/>
+              </a:solidFill>
+              <a:highlight>
+                <a:srgbClr val="FFFFFF"/>
+              </a:highlight>
+              <a:latin typeface="Consolas" panose="020B0609020204030204" pitchFamily="49" charset="0"/>
+            </a:endParaRPr>
           </a:p>
           <a:p>
             <a:pPr marL="0" indent="0">
@@ -13751,15 +13872,33 @@
                                   </p:childTnLst>
                                 </p:cTn>
                               </p:par>
+                            </p:childTnLst>
+                          </p:cTn>
+                        </p:par>
+                      </p:childTnLst>
+                    </p:cTn>
+                  </p:par>
+                  <p:par>
+                    <p:cTn id="8" fill="hold">
+                      <p:stCondLst>
+                        <p:cond delay="indefinite"/>
+                      </p:stCondLst>
+                      <p:childTnLst>
+                        <p:par>
+                          <p:cTn id="9" fill="hold">
+                            <p:stCondLst>
+                              <p:cond delay="0"/>
+                            </p:stCondLst>
+                            <p:childTnLst>
                               <p:par>
-                                <p:cTn id="8" presetID="10" presetClass="entr" presetSubtype="0" fill="hold" nodeType="withEffect">
+                                <p:cTn id="10" presetID="10" presetClass="entr" presetSubtype="0" fill="hold" nodeType="clickEffect">
                                   <p:stCondLst>
                                     <p:cond delay="0"/>
                                   </p:stCondLst>
                                   <p:childTnLst>
                                     <p:set>
                                       <p:cBhvr>
-                                        <p:cTn id="9" dur="1" fill="hold">
+                                        <p:cTn id="11" dur="1" fill="hold">
                                           <p:stCondLst>
                                             <p:cond delay="0"/>
                                           </p:stCondLst>
@@ -13781,7 +13920,7 @@
                                     </p:set>
                                     <p:animEffect transition="in" filter="fade">
                                       <p:cBhvr>
-                                        <p:cTn id="10" dur="500"/>
+                                        <p:cTn id="12" dur="500"/>
                                         <p:tgtEl>
                                           <p:spTgt spid="3">
                                             <p:txEl>
@@ -13794,15 +13933,33 @@
                                   </p:childTnLst>
                                 </p:cTn>
                               </p:par>
+                            </p:childTnLst>
+                          </p:cTn>
+                        </p:par>
+                      </p:childTnLst>
+                    </p:cTn>
+                  </p:par>
+                  <p:par>
+                    <p:cTn id="13" fill="hold">
+                      <p:stCondLst>
+                        <p:cond delay="indefinite"/>
+                      </p:stCondLst>
+                      <p:childTnLst>
+                        <p:par>
+                          <p:cTn id="14" fill="hold">
+                            <p:stCondLst>
+                              <p:cond delay="0"/>
+                            </p:stCondLst>
+                            <p:childTnLst>
                               <p:par>
-                                <p:cTn id="11" presetID="10" presetClass="entr" presetSubtype="0" fill="hold" nodeType="withEffect">
+                                <p:cTn id="15" presetID="10" presetClass="entr" presetSubtype="0" fill="hold" nodeType="clickEffect">
                                   <p:stCondLst>
                                     <p:cond delay="0"/>
                                   </p:stCondLst>
                                   <p:childTnLst>
                                     <p:set>
                                       <p:cBhvr>
-                                        <p:cTn id="12" dur="1" fill="hold">
+                                        <p:cTn id="16" dur="1" fill="hold">
                                           <p:stCondLst>
                                             <p:cond delay="0"/>
                                           </p:stCondLst>
@@ -13824,11 +13981,133 @@
                                     </p:set>
                                     <p:animEffect transition="in" filter="fade">
                                       <p:cBhvr>
-                                        <p:cTn id="13" dur="500"/>
+                                        <p:cTn id="17" dur="500"/>
                                         <p:tgtEl>
                                           <p:spTgt spid="3">
                                             <p:txEl>
                                               <p:pRg st="5" end="5"/>
+                                            </p:txEl>
+                                          </p:spTgt>
+                                        </p:tgtEl>
+                                      </p:cBhvr>
+                                    </p:animEffect>
+                                  </p:childTnLst>
+                                </p:cTn>
+                              </p:par>
+                            </p:childTnLst>
+                          </p:cTn>
+                        </p:par>
+                      </p:childTnLst>
+                    </p:cTn>
+                  </p:par>
+                  <p:par>
+                    <p:cTn id="18" fill="hold">
+                      <p:stCondLst>
+                        <p:cond delay="indefinite"/>
+                      </p:stCondLst>
+                      <p:childTnLst>
+                        <p:par>
+                          <p:cTn id="19" fill="hold">
+                            <p:stCondLst>
+                              <p:cond delay="0"/>
+                            </p:stCondLst>
+                            <p:childTnLst>
+                              <p:par>
+                                <p:cTn id="20" presetID="10" presetClass="entr" presetSubtype="0" fill="hold" nodeType="clickEffect">
+                                  <p:stCondLst>
+                                    <p:cond delay="0"/>
+                                  </p:stCondLst>
+                                  <p:childTnLst>
+                                    <p:set>
+                                      <p:cBhvr>
+                                        <p:cTn id="21" dur="1" fill="hold">
+                                          <p:stCondLst>
+                                            <p:cond delay="0"/>
+                                          </p:stCondLst>
+                                        </p:cTn>
+                                        <p:tgtEl>
+                                          <p:spTgt spid="3">
+                                            <p:txEl>
+                                              <p:pRg st="6" end="6"/>
+                                            </p:txEl>
+                                          </p:spTgt>
+                                        </p:tgtEl>
+                                        <p:attrNameLst>
+                                          <p:attrName>style.visibility</p:attrName>
+                                        </p:attrNameLst>
+                                      </p:cBhvr>
+                                      <p:to>
+                                        <p:strVal val="visible"/>
+                                      </p:to>
+                                    </p:set>
+                                    <p:animEffect transition="in" filter="fade">
+                                      <p:cBhvr>
+                                        <p:cTn id="22" dur="500"/>
+                                        <p:tgtEl>
+                                          <p:spTgt spid="3">
+                                            <p:txEl>
+                                              <p:pRg st="6" end="6"/>
+                                            </p:txEl>
+                                          </p:spTgt>
+                                        </p:tgtEl>
+                                      </p:cBhvr>
+                                    </p:animEffect>
+                                  </p:childTnLst>
+                                </p:cTn>
+                              </p:par>
+                            </p:childTnLst>
+                          </p:cTn>
+                        </p:par>
+                      </p:childTnLst>
+                    </p:cTn>
+                  </p:par>
+                  <p:par>
+                    <p:cTn id="23" fill="hold">
+                      <p:stCondLst>
+                        <p:cond delay="indefinite"/>
+                      </p:stCondLst>
+                      <p:childTnLst>
+                        <p:par>
+                          <p:cTn id="24" fill="hold">
+                            <p:stCondLst>
+                              <p:cond delay="0"/>
+                            </p:stCondLst>
+                            <p:childTnLst>
+                              <p:par>
+                                <p:cTn id="25" presetID="10" presetClass="entr" presetSubtype="0" fill="hold" nodeType="clickEffect">
+                                  <p:stCondLst>
+                                    <p:cond delay="0"/>
+                                  </p:stCondLst>
+                                  <p:childTnLst>
+                                    <p:set>
+                                      <p:cBhvr>
+                                        <p:cTn id="26" dur="1" fill="hold">
+                                          <p:stCondLst>
+                                            <p:cond delay="0"/>
+                                          </p:stCondLst>
+                                        </p:cTn>
+                                        <p:tgtEl>
+                                          <p:spTgt spid="3">
+                                            <p:txEl>
+                                              <p:pRg st="7" end="7"/>
+                                            </p:txEl>
+                                          </p:spTgt>
+                                        </p:tgtEl>
+                                        <p:attrNameLst>
+                                          <p:attrName>style.visibility</p:attrName>
+                                        </p:attrNameLst>
+                                      </p:cBhvr>
+                                      <p:to>
+                                        <p:strVal val="visible"/>
+                                      </p:to>
+                                    </p:set>
+                                    <p:animEffect transition="in" filter="fade">
+                                      <p:cBhvr>
+                                        <p:cTn id="27" dur="500"/>
+                                        <p:tgtEl>
+                                          <p:spTgt spid="3">
+                                            <p:txEl>
+                                              <p:pRg st="7" end="7"/>
                                             </p:txEl>
                                           </p:spTgt>
                                         </p:tgtEl>
@@ -15769,15 +16048,6 @@
               </a:rPr>
               <a:t>);</a:t>
             </a:r>
-            <a:endParaRPr lang="de-DE" sz="1800" dirty="0" smtClean="0">
-              <a:solidFill>
-                <a:srgbClr val="000000"/>
-              </a:solidFill>
-              <a:highlight>
-                <a:srgbClr val="FFFFFF"/>
-              </a:highlight>
-              <a:latin typeface="Consolas" panose="020B0609020204030204" pitchFamily="49" charset="0"/>
-            </a:endParaRPr>
           </a:p>
           <a:p>
             <a:pPr marL="0" indent="0">

</xml_diff>